<commit_message>
add Data to chart and table page Irrigation
add Data to chart and table page Irrigation
</commit_message>
<xml_diff>
--- a/my-app1/src/Web_App.pptx
+++ b/my-app1/src/Web_App.pptx
@@ -8,19 +8,20 @@
     <p:sldId id="263" r:id="rId2"/>
     <p:sldId id="256" r:id="rId3"/>
     <p:sldId id="272" r:id="rId4"/>
-    <p:sldId id="259" r:id="rId5"/>
-    <p:sldId id="265" r:id="rId6"/>
-    <p:sldId id="262" r:id="rId7"/>
-    <p:sldId id="260" r:id="rId8"/>
-    <p:sldId id="261" r:id="rId9"/>
-    <p:sldId id="266" r:id="rId10"/>
-    <p:sldId id="264" r:id="rId11"/>
-    <p:sldId id="267" r:id="rId12"/>
-    <p:sldId id="268" r:id="rId13"/>
-    <p:sldId id="269" r:id="rId14"/>
-    <p:sldId id="270" r:id="rId15"/>
-    <p:sldId id="271" r:id="rId16"/>
-    <p:sldId id="258" r:id="rId17"/>
+    <p:sldId id="273" r:id="rId5"/>
+    <p:sldId id="259" r:id="rId6"/>
+    <p:sldId id="265" r:id="rId7"/>
+    <p:sldId id="262" r:id="rId8"/>
+    <p:sldId id="260" r:id="rId9"/>
+    <p:sldId id="261" r:id="rId10"/>
+    <p:sldId id="266" r:id="rId11"/>
+    <p:sldId id="264" r:id="rId12"/>
+    <p:sldId id="267" r:id="rId13"/>
+    <p:sldId id="268" r:id="rId14"/>
+    <p:sldId id="269" r:id="rId15"/>
+    <p:sldId id="270" r:id="rId16"/>
+    <p:sldId id="271" r:id="rId17"/>
+    <p:sldId id="258" r:id="rId18"/>
   </p:sldIdLst>
   <p:sldSz cx="12192000" cy="6858000"/>
   <p:notesSz cx="6858000" cy="9144000"/>
@@ -274,7 +275,7 @@
           <a:p>
             <a:fld id="{4CA111CD-02F0-4221-AD8C-2FBDC4F2E84D}" type="datetimeFigureOut">
               <a:rPr lang="th-TH" smtClean="0"/>
-              <a:t>27/02/65</a:t>
+              <a:t>12/03/65</a:t>
             </a:fld>
             <a:endParaRPr lang="th-TH"/>
           </a:p>
@@ -472,7 +473,7 @@
           <a:p>
             <a:fld id="{4CA111CD-02F0-4221-AD8C-2FBDC4F2E84D}" type="datetimeFigureOut">
               <a:rPr lang="th-TH" smtClean="0"/>
-              <a:t>27/02/65</a:t>
+              <a:t>12/03/65</a:t>
             </a:fld>
             <a:endParaRPr lang="th-TH"/>
           </a:p>
@@ -680,7 +681,7 @@
           <a:p>
             <a:fld id="{4CA111CD-02F0-4221-AD8C-2FBDC4F2E84D}" type="datetimeFigureOut">
               <a:rPr lang="th-TH" smtClean="0"/>
-              <a:t>27/02/65</a:t>
+              <a:t>12/03/65</a:t>
             </a:fld>
             <a:endParaRPr lang="th-TH"/>
           </a:p>
@@ -878,7 +879,7 @@
           <a:p>
             <a:fld id="{4CA111CD-02F0-4221-AD8C-2FBDC4F2E84D}" type="datetimeFigureOut">
               <a:rPr lang="th-TH" smtClean="0"/>
-              <a:t>27/02/65</a:t>
+              <a:t>12/03/65</a:t>
             </a:fld>
             <a:endParaRPr lang="th-TH"/>
           </a:p>
@@ -1153,7 +1154,7 @@
           <a:p>
             <a:fld id="{4CA111CD-02F0-4221-AD8C-2FBDC4F2E84D}" type="datetimeFigureOut">
               <a:rPr lang="th-TH" smtClean="0"/>
-              <a:t>27/02/65</a:t>
+              <a:t>12/03/65</a:t>
             </a:fld>
             <a:endParaRPr lang="th-TH"/>
           </a:p>
@@ -1418,7 +1419,7 @@
           <a:p>
             <a:fld id="{4CA111CD-02F0-4221-AD8C-2FBDC4F2E84D}" type="datetimeFigureOut">
               <a:rPr lang="th-TH" smtClean="0"/>
-              <a:t>27/02/65</a:t>
+              <a:t>12/03/65</a:t>
             </a:fld>
             <a:endParaRPr lang="th-TH"/>
           </a:p>
@@ -1830,7 +1831,7 @@
           <a:p>
             <a:fld id="{4CA111CD-02F0-4221-AD8C-2FBDC4F2E84D}" type="datetimeFigureOut">
               <a:rPr lang="th-TH" smtClean="0"/>
-              <a:t>27/02/65</a:t>
+              <a:t>12/03/65</a:t>
             </a:fld>
             <a:endParaRPr lang="th-TH"/>
           </a:p>
@@ -1971,7 +1972,7 @@
           <a:p>
             <a:fld id="{4CA111CD-02F0-4221-AD8C-2FBDC4F2E84D}" type="datetimeFigureOut">
               <a:rPr lang="th-TH" smtClean="0"/>
-              <a:t>27/02/65</a:t>
+              <a:t>12/03/65</a:t>
             </a:fld>
             <a:endParaRPr lang="th-TH"/>
           </a:p>
@@ -2084,7 +2085,7 @@
           <a:p>
             <a:fld id="{4CA111CD-02F0-4221-AD8C-2FBDC4F2E84D}" type="datetimeFigureOut">
               <a:rPr lang="th-TH" smtClean="0"/>
-              <a:t>27/02/65</a:t>
+              <a:t>12/03/65</a:t>
             </a:fld>
             <a:endParaRPr lang="th-TH"/>
           </a:p>
@@ -2395,7 +2396,7 @@
           <a:p>
             <a:fld id="{4CA111CD-02F0-4221-AD8C-2FBDC4F2E84D}" type="datetimeFigureOut">
               <a:rPr lang="th-TH" smtClean="0"/>
-              <a:t>27/02/65</a:t>
+              <a:t>12/03/65</a:t>
             </a:fld>
             <a:endParaRPr lang="th-TH"/>
           </a:p>
@@ -2683,7 +2684,7 @@
           <a:p>
             <a:fld id="{4CA111CD-02F0-4221-AD8C-2FBDC4F2E84D}" type="datetimeFigureOut">
               <a:rPr lang="th-TH" smtClean="0"/>
-              <a:t>27/02/65</a:t>
+              <a:t>12/03/65</a:t>
             </a:fld>
             <a:endParaRPr lang="th-TH"/>
           </a:p>
@@ -2924,7 +2925,7 @@
           <a:p>
             <a:fld id="{4CA111CD-02F0-4221-AD8C-2FBDC4F2E84D}" type="datetimeFigureOut">
               <a:rPr lang="th-TH" smtClean="0"/>
-              <a:t>27/02/65</a:t>
+              <a:t>12/03/65</a:t>
             </a:fld>
             <a:endParaRPr lang="th-TH"/>
           </a:p>
@@ -3414,12 +3415,347 @@
           <a:chExt cx="0" cy="0"/>
         </a:xfrm>
       </p:grpSpPr>
+      <p:pic>
+        <p:nvPicPr>
+          <p:cNvPr id="2050" name="Picture 2" descr="ไม่มีคำอธิบาย">
+            <a:extLst>
+              <a:ext uri="{FF2B5EF4-FFF2-40B4-BE49-F238E27FC236}">
+                <a16:creationId xmlns:a16="http://schemas.microsoft.com/office/drawing/2014/main" id="{0369A667-801B-4210-B19E-064A5D9FEAE6}"/>
+              </a:ext>
+            </a:extLst>
+          </p:cNvPr>
+          <p:cNvPicPr>
+            <a:picLocks noChangeAspect="1" noChangeArrowheads="1"/>
+          </p:cNvPicPr>
+          <p:nvPr/>
+        </p:nvPicPr>
+        <p:blipFill rotWithShape="1">
+          <a:blip r:embed="rId2">
+            <a:extLst>
+              <a:ext uri="{28A0092B-C50C-407E-A947-70E740481C1C}">
+                <a14:useLocalDpi xmlns:a14="http://schemas.microsoft.com/office/drawing/2010/main" val="0"/>
+              </a:ext>
+            </a:extLst>
+          </a:blip>
+          <a:srcRect l="17750"/>
+          <a:stretch/>
+        </p:blipFill>
+        <p:spPr bwMode="auto">
+          <a:xfrm>
+            <a:off x="2164080" y="0"/>
+            <a:ext cx="10027920" cy="6858000"/>
+          </a:xfrm>
+          <a:prstGeom prst="rect">
+            <a:avLst/>
+          </a:prstGeom>
+          <a:noFill/>
+          <a:ln>
+            <a:solidFill>
+              <a:schemeClr val="tx1"/>
+            </a:solidFill>
+          </a:ln>
+          <a:extLst>
+            <a:ext uri="{909E8E84-426E-40DD-AFC4-6F175D3DCCD1}">
+              <a14:hiddenFill xmlns:a14="http://schemas.microsoft.com/office/drawing/2010/main">
+                <a:solidFill>
+                  <a:srgbClr val="FFFFFF"/>
+                </a:solidFill>
+              </a14:hiddenFill>
+            </a:ext>
+          </a:extLst>
+        </p:spPr>
+      </p:pic>
+      <p:cxnSp>
+        <p:nvCxnSpPr>
+          <p:cNvPr id="15" name="ตัวเชื่อมต่อตรง 14">
+            <a:extLst>
+              <a:ext uri="{FF2B5EF4-FFF2-40B4-BE49-F238E27FC236}">
+                <a16:creationId xmlns:a16="http://schemas.microsoft.com/office/drawing/2014/main" id="{C8FECEAE-5585-4664-8924-BFEDE67DC4F4}"/>
+              </a:ext>
+            </a:extLst>
+          </p:cNvPr>
+          <p:cNvCxnSpPr/>
+          <p:nvPr/>
+        </p:nvCxnSpPr>
+        <p:spPr>
+          <a:xfrm>
+            <a:off x="2142565" y="0"/>
+            <a:ext cx="0" cy="6858000"/>
+          </a:xfrm>
+          <a:prstGeom prst="line">
+            <a:avLst/>
+          </a:prstGeom>
+          <a:ln w="28575">
+            <a:solidFill>
+              <a:schemeClr val="tx2">
+                <a:lumMod val="40000"/>
+                <a:lumOff val="60000"/>
+              </a:schemeClr>
+            </a:solidFill>
+          </a:ln>
+        </p:spPr>
+        <p:style>
+          <a:lnRef idx="1">
+            <a:schemeClr val="accent1"/>
+          </a:lnRef>
+          <a:fillRef idx="0">
+            <a:schemeClr val="accent1"/>
+          </a:fillRef>
+          <a:effectRef idx="0">
+            <a:schemeClr val="accent1"/>
+          </a:effectRef>
+          <a:fontRef idx="minor">
+            <a:schemeClr val="tx1"/>
+          </a:fontRef>
+        </p:style>
+      </p:cxnSp>
       <p:sp>
         <p:nvSpPr>
-          <p:cNvPr id="9" name="กล่องข้อความ 8">
-            <a:extLst>
-              <a:ext uri="{FF2B5EF4-FFF2-40B4-BE49-F238E27FC236}">
-                <a16:creationId xmlns:a16="http://schemas.microsoft.com/office/drawing/2014/main" id="{C626A5EC-621A-4242-BFF6-7A793F20F754}"/>
+          <p:cNvPr id="16" name="สี่เหลี่ยมผืนผ้า 15">
+            <a:extLst>
+              <a:ext uri="{FF2B5EF4-FFF2-40B4-BE49-F238E27FC236}">
+                <a16:creationId xmlns:a16="http://schemas.microsoft.com/office/drawing/2014/main" id="{C07F4C03-65E7-4823-B1C1-DA75134DFEAE}"/>
+              </a:ext>
+            </a:extLst>
+          </p:cNvPr>
+          <p:cNvSpPr/>
+          <p:nvPr/>
+        </p:nvSpPr>
+        <p:spPr>
+          <a:xfrm>
+            <a:off x="1275526" y="0"/>
+            <a:ext cx="855534" cy="350520"/>
+          </a:xfrm>
+          <a:prstGeom prst="rect">
+            <a:avLst/>
+          </a:prstGeom>
+          <a:solidFill>
+            <a:schemeClr val="bg1"/>
+          </a:solidFill>
+          <a:ln>
+            <a:noFill/>
+          </a:ln>
+        </p:spPr>
+        <p:style>
+          <a:lnRef idx="2">
+            <a:schemeClr val="accent1">
+              <a:shade val="50000"/>
+            </a:schemeClr>
+          </a:lnRef>
+          <a:fillRef idx="1">
+            <a:schemeClr val="accent1"/>
+          </a:fillRef>
+          <a:effectRef idx="0">
+            <a:schemeClr val="accent1"/>
+          </a:effectRef>
+          <a:fontRef idx="minor">
+            <a:schemeClr val="lt1"/>
+          </a:fontRef>
+        </p:style>
+        <p:txBody>
+          <a:bodyPr rtlCol="0" anchor="ctr"/>
+          <a:lstStyle/>
+          <a:p>
+            <a:pPr algn="ctr"/>
+            <a:r>
+              <a:rPr lang="en-US" sz="1200" dirty="0">
+                <a:solidFill>
+                  <a:schemeClr val="tx1"/>
+                </a:solidFill>
+              </a:rPr>
+              <a:t>Irrigation</a:t>
+            </a:r>
+            <a:endParaRPr lang="th-TH" sz="1400" dirty="0">
+              <a:solidFill>
+                <a:schemeClr val="tx1"/>
+              </a:solidFill>
+            </a:endParaRPr>
+          </a:p>
+        </p:txBody>
+      </p:sp>
+      <p:sp>
+        <p:nvSpPr>
+          <p:cNvPr id="17" name="สี่เหลี่ยมผืนผ้า 16">
+            <a:extLst>
+              <a:ext uri="{FF2B5EF4-FFF2-40B4-BE49-F238E27FC236}">
+                <a16:creationId xmlns:a16="http://schemas.microsoft.com/office/drawing/2014/main" id="{18F2D985-DC4D-4CD6-9218-C734461B72FC}"/>
+              </a:ext>
+            </a:extLst>
+          </p:cNvPr>
+          <p:cNvSpPr/>
+          <p:nvPr/>
+        </p:nvSpPr>
+        <p:spPr>
+          <a:xfrm>
+            <a:off x="1280008" y="350520"/>
+            <a:ext cx="855534" cy="350520"/>
+          </a:xfrm>
+          <a:prstGeom prst="rect">
+            <a:avLst/>
+          </a:prstGeom>
+          <a:solidFill>
+            <a:schemeClr val="bg1"/>
+          </a:solidFill>
+          <a:ln>
+            <a:noFill/>
+          </a:ln>
+        </p:spPr>
+        <p:style>
+          <a:lnRef idx="2">
+            <a:schemeClr val="accent1">
+              <a:shade val="50000"/>
+            </a:schemeClr>
+          </a:lnRef>
+          <a:fillRef idx="1">
+            <a:schemeClr val="accent1"/>
+          </a:fillRef>
+          <a:effectRef idx="0">
+            <a:schemeClr val="accent1"/>
+          </a:effectRef>
+          <a:fontRef idx="minor">
+            <a:schemeClr val="lt1"/>
+          </a:fontRef>
+        </p:style>
+        <p:txBody>
+          <a:bodyPr rtlCol="0" anchor="ctr"/>
+          <a:lstStyle/>
+          <a:p>
+            <a:pPr algn="ctr"/>
+            <a:r>
+              <a:rPr lang="en-US" sz="1200" dirty="0">
+                <a:solidFill>
+                  <a:schemeClr val="bg1">
+                    <a:lumMod val="75000"/>
+                  </a:schemeClr>
+                </a:solidFill>
+              </a:rPr>
+              <a:t>Weather</a:t>
+            </a:r>
+            <a:endParaRPr lang="th-TH" sz="1400" dirty="0">
+              <a:solidFill>
+                <a:schemeClr val="bg1">
+                  <a:lumMod val="75000"/>
+                </a:schemeClr>
+              </a:solidFill>
+            </a:endParaRPr>
+          </a:p>
+        </p:txBody>
+      </p:sp>
+      <p:sp>
+        <p:nvSpPr>
+          <p:cNvPr id="18" name="สี่เหลี่ยมผืนผ้า 17">
+            <a:extLst>
+              <a:ext uri="{FF2B5EF4-FFF2-40B4-BE49-F238E27FC236}">
+                <a16:creationId xmlns:a16="http://schemas.microsoft.com/office/drawing/2014/main" id="{78E218D4-42AC-4146-BD79-D8B1B97D9AB0}"/>
+              </a:ext>
+            </a:extLst>
+          </p:cNvPr>
+          <p:cNvSpPr/>
+          <p:nvPr/>
+        </p:nvSpPr>
+        <p:spPr>
+          <a:xfrm>
+            <a:off x="1280008" y="701040"/>
+            <a:ext cx="855534" cy="350520"/>
+          </a:xfrm>
+          <a:prstGeom prst="rect">
+            <a:avLst/>
+          </a:prstGeom>
+          <a:solidFill>
+            <a:srgbClr val="00B0F0"/>
+          </a:solidFill>
+          <a:ln>
+            <a:noFill/>
+          </a:ln>
+        </p:spPr>
+        <p:style>
+          <a:lnRef idx="2">
+            <a:schemeClr val="accent1">
+              <a:shade val="50000"/>
+            </a:schemeClr>
+          </a:lnRef>
+          <a:fillRef idx="1">
+            <a:schemeClr val="accent1"/>
+          </a:fillRef>
+          <a:effectRef idx="0">
+            <a:schemeClr val="accent1"/>
+          </a:effectRef>
+          <a:fontRef idx="minor">
+            <a:schemeClr val="lt1"/>
+          </a:fontRef>
+        </p:style>
+        <p:txBody>
+          <a:bodyPr rtlCol="0" anchor="ctr"/>
+          <a:lstStyle/>
+          <a:p>
+            <a:pPr algn="ctr"/>
+            <a:r>
+              <a:rPr lang="en-US" sz="1200" dirty="0">
+                <a:ln w="0"/>
+                <a:solidFill>
+                  <a:schemeClr val="tx1"/>
+                </a:solidFill>
+                <a:effectLst>
+                  <a:outerShdw blurRad="38100" dist="19050" dir="2700000" algn="tl" rotWithShape="0">
+                    <a:schemeClr val="dk1">
+                      <a:alpha val="40000"/>
+                    </a:schemeClr>
+                  </a:outerShdw>
+                </a:effectLst>
+              </a:rPr>
+              <a:t>Lysimeter</a:t>
+            </a:r>
+            <a:endParaRPr lang="th-TH" sz="1200" dirty="0">
+              <a:ln w="0"/>
+              <a:solidFill>
+                <a:schemeClr val="tx1"/>
+              </a:solidFill>
+              <a:effectLst>
+                <a:outerShdw blurRad="38100" dist="19050" dir="2700000" algn="tl" rotWithShape="0">
+                  <a:schemeClr val="dk1">
+                    <a:alpha val="40000"/>
+                  </a:schemeClr>
+                </a:outerShdw>
+              </a:effectLst>
+            </a:endParaRPr>
+          </a:p>
+        </p:txBody>
+      </p:sp>
+      <p:pic>
+        <p:nvPicPr>
+          <p:cNvPr id="19" name="รูปภาพ 18">
+            <a:extLst>
+              <a:ext uri="{FF2B5EF4-FFF2-40B4-BE49-F238E27FC236}">
+                <a16:creationId xmlns:a16="http://schemas.microsoft.com/office/drawing/2014/main" id="{1795F767-7F8B-4FDF-A2BD-DBBFC37D9D57}"/>
+              </a:ext>
+            </a:extLst>
+          </p:cNvPr>
+          <p:cNvPicPr>
+            <a:picLocks noChangeAspect="1"/>
+          </p:cNvPicPr>
+          <p:nvPr/>
+        </p:nvPicPr>
+        <p:blipFill rotWithShape="1">
+          <a:blip r:embed="rId3"/>
+          <a:srcRect r="89559"/>
+          <a:stretch/>
+        </p:blipFill>
+        <p:spPr>
+          <a:xfrm>
+            <a:off x="0" y="0"/>
+            <a:ext cx="1330960" cy="6858000"/>
+          </a:xfrm>
+          <a:prstGeom prst="rect">
+            <a:avLst/>
+          </a:prstGeom>
+        </p:spPr>
+      </p:pic>
+      <p:sp>
+        <p:nvSpPr>
+          <p:cNvPr id="9" name="กล่องข้อความ 9">
+            <a:extLst>
+              <a:ext uri="{FF2B5EF4-FFF2-40B4-BE49-F238E27FC236}">
+                <a16:creationId xmlns:a16="http://schemas.microsoft.com/office/drawing/2014/main" id="{C801EF94-864C-42A8-9EEB-5000DD91A2D9}"/>
               </a:ext>
             </a:extLst>
           </p:cNvPr>
@@ -3428,8 +3764,8 @@
         </p:nvSpPr>
         <p:spPr>
           <a:xfrm>
-            <a:off x="3730336" y="2875002"/>
-            <a:ext cx="4731328" cy="1107996"/>
+            <a:off x="0" y="3915233"/>
+            <a:ext cx="4731328" cy="400110"/>
           </a:xfrm>
           <a:prstGeom prst="rect">
             <a:avLst/>
@@ -3445,14 +3781,1180 @@
           </a:bodyPr>
           <a:lstStyle/>
           <a:p>
-            <a:pPr algn="ctr"/>
-            <a:r>
-              <a:rPr lang="en-US" sz="6600" b="1" dirty="0">
+            <a:r>
+              <a:rPr lang="en-US" sz="2000" dirty="0">
                 <a:solidFill>
                   <a:srgbClr val="FF0000"/>
                 </a:solidFill>
               </a:rPr>
-              <a:t>ANALYSIS</a:t>
+              <a:t>HEADER : Lysimeter</a:t>
+            </a:r>
+          </a:p>
+        </p:txBody>
+      </p:sp>
+      <p:graphicFrame>
+        <p:nvGraphicFramePr>
+          <p:cNvPr id="11" name="Table 2">
+            <a:extLst>
+              <a:ext uri="{FF2B5EF4-FFF2-40B4-BE49-F238E27FC236}">
+                <a16:creationId xmlns:a16="http://schemas.microsoft.com/office/drawing/2014/main" id="{8DC7F30B-62ED-4395-9B0E-A4620DE88527}"/>
+              </a:ext>
+            </a:extLst>
+          </p:cNvPr>
+          <p:cNvGraphicFramePr>
+            <a:graphicFrameLocks noGrp="1"/>
+          </p:cNvGraphicFramePr>
+          <p:nvPr/>
+        </p:nvGraphicFramePr>
+        <p:xfrm>
+          <a:off x="109753" y="4442945"/>
+          <a:ext cx="14370364" cy="370840"/>
+        </p:xfrm>
+        <a:graphic>
+          <a:graphicData uri="http://schemas.openxmlformats.org/drawingml/2006/table">
+            <a:tbl>
+              <a:tblPr firstRow="1" bandRow="1">
+                <a:tableStyleId>{5C22544A-7EE6-4342-B048-85BDC9FD1C3A}</a:tableStyleId>
+              </a:tblPr>
+              <a:tblGrid>
+                <a:gridCol w="687224">
+                  <a:extLst>
+                    <a:ext uri="{9D8B030D-6E8A-4147-A177-3AD203B41FA5}">
+                      <a16:colId xmlns:a16="http://schemas.microsoft.com/office/drawing/2014/main" val="274091452"/>
+                    </a:ext>
+                  </a:extLst>
+                </a:gridCol>
+                <a:gridCol w="813718">
+                  <a:extLst>
+                    <a:ext uri="{9D8B030D-6E8A-4147-A177-3AD203B41FA5}">
+                      <a16:colId xmlns:a16="http://schemas.microsoft.com/office/drawing/2014/main" val="2120765457"/>
+                    </a:ext>
+                  </a:extLst>
+                </a:gridCol>
+                <a:gridCol w="813718">
+                  <a:extLst>
+                    <a:ext uri="{9D8B030D-6E8A-4147-A177-3AD203B41FA5}">
+                      <a16:colId xmlns:a16="http://schemas.microsoft.com/office/drawing/2014/main" val="3799856074"/>
+                    </a:ext>
+                  </a:extLst>
+                </a:gridCol>
+                <a:gridCol w="813718">
+                  <a:extLst>
+                    <a:ext uri="{9D8B030D-6E8A-4147-A177-3AD203B41FA5}">
+                      <a16:colId xmlns:a16="http://schemas.microsoft.com/office/drawing/2014/main" val="1175590461"/>
+                    </a:ext>
+                  </a:extLst>
+                </a:gridCol>
+                <a:gridCol w="802102">
+                  <a:extLst>
+                    <a:ext uri="{9D8B030D-6E8A-4147-A177-3AD203B41FA5}">
+                      <a16:colId xmlns:a16="http://schemas.microsoft.com/office/drawing/2014/main" val="20303640"/>
+                    </a:ext>
+                  </a:extLst>
+                </a:gridCol>
+                <a:gridCol w="832432">
+                  <a:extLst>
+                    <a:ext uri="{9D8B030D-6E8A-4147-A177-3AD203B41FA5}">
+                      <a16:colId xmlns:a16="http://schemas.microsoft.com/office/drawing/2014/main" val="1778278904"/>
+                    </a:ext>
+                  </a:extLst>
+                </a:gridCol>
+                <a:gridCol w="832432">
+                  <a:extLst>
+                    <a:ext uri="{9D8B030D-6E8A-4147-A177-3AD203B41FA5}">
+                      <a16:colId xmlns:a16="http://schemas.microsoft.com/office/drawing/2014/main" val="3340717806"/>
+                    </a:ext>
+                  </a:extLst>
+                </a:gridCol>
+                <a:gridCol w="832432">
+                  <a:extLst>
+                    <a:ext uri="{9D8B030D-6E8A-4147-A177-3AD203B41FA5}">
+                      <a16:colId xmlns:a16="http://schemas.microsoft.com/office/drawing/2014/main" val="19805540"/>
+                    </a:ext>
+                  </a:extLst>
+                </a:gridCol>
+                <a:gridCol w="832432">
+                  <a:extLst>
+                    <a:ext uri="{9D8B030D-6E8A-4147-A177-3AD203B41FA5}">
+                      <a16:colId xmlns:a16="http://schemas.microsoft.com/office/drawing/2014/main" val="1808746165"/>
+                    </a:ext>
+                  </a:extLst>
+                </a:gridCol>
+                <a:gridCol w="832432">
+                  <a:extLst>
+                    <a:ext uri="{9D8B030D-6E8A-4147-A177-3AD203B41FA5}">
+                      <a16:colId xmlns:a16="http://schemas.microsoft.com/office/drawing/2014/main" val="2971934486"/>
+                    </a:ext>
+                  </a:extLst>
+                </a:gridCol>
+                <a:gridCol w="913730">
+                  <a:extLst>
+                    <a:ext uri="{9D8B030D-6E8A-4147-A177-3AD203B41FA5}">
+                      <a16:colId xmlns:a16="http://schemas.microsoft.com/office/drawing/2014/main" val="3396524758"/>
+                    </a:ext>
+                  </a:extLst>
+                </a:gridCol>
+                <a:gridCol w="913730">
+                  <a:extLst>
+                    <a:ext uri="{9D8B030D-6E8A-4147-A177-3AD203B41FA5}">
+                      <a16:colId xmlns:a16="http://schemas.microsoft.com/office/drawing/2014/main" val="1501057620"/>
+                    </a:ext>
+                  </a:extLst>
+                </a:gridCol>
+                <a:gridCol w="913730">
+                  <a:extLst>
+                    <a:ext uri="{9D8B030D-6E8A-4147-A177-3AD203B41FA5}">
+                      <a16:colId xmlns:a16="http://schemas.microsoft.com/office/drawing/2014/main" val="2443106077"/>
+                    </a:ext>
+                  </a:extLst>
+                </a:gridCol>
+                <a:gridCol w="913730">
+                  <a:extLst>
+                    <a:ext uri="{9D8B030D-6E8A-4147-A177-3AD203B41FA5}">
+                      <a16:colId xmlns:a16="http://schemas.microsoft.com/office/drawing/2014/main" val="3269512156"/>
+                    </a:ext>
+                  </a:extLst>
+                </a:gridCol>
+                <a:gridCol w="874268">
+                  <a:extLst>
+                    <a:ext uri="{9D8B030D-6E8A-4147-A177-3AD203B41FA5}">
+                      <a16:colId xmlns:a16="http://schemas.microsoft.com/office/drawing/2014/main" val="965637348"/>
+                    </a:ext>
+                  </a:extLst>
+                </a:gridCol>
+                <a:gridCol w="874268">
+                  <a:extLst>
+                    <a:ext uri="{9D8B030D-6E8A-4147-A177-3AD203B41FA5}">
+                      <a16:colId xmlns:a16="http://schemas.microsoft.com/office/drawing/2014/main" val="2981958106"/>
+                    </a:ext>
+                  </a:extLst>
+                </a:gridCol>
+                <a:gridCol w="874268">
+                  <a:extLst>
+                    <a:ext uri="{9D8B030D-6E8A-4147-A177-3AD203B41FA5}">
+                      <a16:colId xmlns:a16="http://schemas.microsoft.com/office/drawing/2014/main" val="3065469031"/>
+                    </a:ext>
+                  </a:extLst>
+                </a:gridCol>
+              </a:tblGrid>
+              <a:tr h="370840">
+                <a:tc>
+                  <a:txBody>
+                    <a:bodyPr/>
+                    <a:lstStyle/>
+                    <a:p>
+                      <a:r>
+                        <a:rPr lang="en-US" sz="1200" dirty="0"/>
+                        <a:t>D/M/Y</a:t>
+                      </a:r>
+                      <a:endParaRPr lang="th-TH" sz="1200" dirty="0"/>
+                    </a:p>
+                  </a:txBody>
+                  <a:tcPr anchor="ctr">
+                    <a:solidFill>
+                      <a:srgbClr val="04AA6D"/>
+                    </a:solidFill>
+                  </a:tcPr>
+                </a:tc>
+                <a:tc>
+                  <a:txBody>
+                    <a:bodyPr/>
+                    <a:lstStyle/>
+                    <a:p>
+                      <a:r>
+                        <a:rPr lang="en-US" sz="1200" dirty="0"/>
+                        <a:t>Lysim_Z1</a:t>
+                      </a:r>
+                      <a:endParaRPr lang="th-TH" sz="1200" dirty="0"/>
+                    </a:p>
+                  </a:txBody>
+                  <a:tcPr anchor="ctr">
+                    <a:solidFill>
+                      <a:srgbClr val="04AA6D"/>
+                    </a:solidFill>
+                  </a:tcPr>
+                </a:tc>
+                <a:tc>
+                  <a:txBody>
+                    <a:bodyPr/>
+                    <a:lstStyle/>
+                    <a:p>
+                      <a:pPr marL="0" marR="0" lvl="0" indent="0" algn="l" defTabSz="914400" rtl="0" eaLnBrk="1" fontAlgn="auto" latinLnBrk="0" hangingPunct="1">
+                        <a:lnSpc>
+                          <a:spcPct val="100000"/>
+                        </a:lnSpc>
+                        <a:spcBef>
+                          <a:spcPts val="0"/>
+                        </a:spcBef>
+                        <a:spcAft>
+                          <a:spcPts val="0"/>
+                        </a:spcAft>
+                        <a:buClrTx/>
+                        <a:buSzTx/>
+                        <a:buFontTx/>
+                        <a:buNone/>
+                        <a:tabLst/>
+                        <a:defRPr/>
+                      </a:pPr>
+                      <a:r>
+                        <a:rPr kumimoji="0" lang="en-US" sz="1200" b="1" i="0" u="none" strike="noStrike" kern="1200" cap="none" spc="0" normalizeH="0" baseline="0" noProof="0" dirty="0">
+                          <a:ln>
+                            <a:noFill/>
+                          </a:ln>
+                          <a:solidFill>
+                            <a:prstClr val="white"/>
+                          </a:solidFill>
+                          <a:effectLst/>
+                          <a:uLnTx/>
+                          <a:uFillTx/>
+                          <a:latin typeface="Calibri" panose="020F0502020204030204"/>
+                          <a:ea typeface="+mn-ea"/>
+                          <a:cs typeface="+mn-cs"/>
+                        </a:rPr>
+                        <a:t>Lysim_Z2</a:t>
+                      </a:r>
+                      <a:endParaRPr kumimoji="0" lang="th-TH" sz="1200" b="1" i="0" u="none" strike="noStrike" kern="1200" cap="none" spc="0" normalizeH="0" baseline="0" noProof="0" dirty="0">
+                        <a:ln>
+                          <a:noFill/>
+                        </a:ln>
+                        <a:solidFill>
+                          <a:prstClr val="white"/>
+                        </a:solidFill>
+                        <a:effectLst/>
+                        <a:uLnTx/>
+                        <a:uFillTx/>
+                        <a:latin typeface="Calibri" panose="020F0502020204030204"/>
+                        <a:ea typeface="+mn-ea"/>
+                        <a:cs typeface="Cordia New" panose="020B0304020202020204" pitchFamily="34" charset="-34"/>
+                      </a:endParaRPr>
+                    </a:p>
+                  </a:txBody>
+                  <a:tcPr anchor="ctr">
+                    <a:solidFill>
+                      <a:srgbClr val="04AA6D"/>
+                    </a:solidFill>
+                  </a:tcPr>
+                </a:tc>
+                <a:tc>
+                  <a:txBody>
+                    <a:bodyPr/>
+                    <a:lstStyle/>
+                    <a:p>
+                      <a:pPr marL="0" marR="0" lvl="0" indent="0" algn="l" defTabSz="914400" rtl="0" eaLnBrk="1" fontAlgn="auto" latinLnBrk="0" hangingPunct="1">
+                        <a:lnSpc>
+                          <a:spcPct val="100000"/>
+                        </a:lnSpc>
+                        <a:spcBef>
+                          <a:spcPts val="0"/>
+                        </a:spcBef>
+                        <a:spcAft>
+                          <a:spcPts val="0"/>
+                        </a:spcAft>
+                        <a:buClrTx/>
+                        <a:buSzTx/>
+                        <a:buFontTx/>
+                        <a:buNone/>
+                        <a:tabLst/>
+                        <a:defRPr/>
+                      </a:pPr>
+                      <a:r>
+                        <a:rPr kumimoji="0" lang="en-US" sz="1200" b="1" i="0" u="none" strike="noStrike" kern="1200" cap="none" spc="0" normalizeH="0" baseline="0" noProof="0" dirty="0">
+                          <a:ln>
+                            <a:noFill/>
+                          </a:ln>
+                          <a:solidFill>
+                            <a:prstClr val="white"/>
+                          </a:solidFill>
+                          <a:effectLst/>
+                          <a:uLnTx/>
+                          <a:uFillTx/>
+                          <a:latin typeface="Calibri" panose="020F0502020204030204"/>
+                          <a:ea typeface="+mn-ea"/>
+                          <a:cs typeface="+mn-cs"/>
+                        </a:rPr>
+                        <a:t>Lysim_Z3</a:t>
+                      </a:r>
+                      <a:endParaRPr kumimoji="0" lang="th-TH" sz="1200" b="1" i="0" u="none" strike="noStrike" kern="1200" cap="none" spc="0" normalizeH="0" baseline="0" noProof="0" dirty="0">
+                        <a:ln>
+                          <a:noFill/>
+                        </a:ln>
+                        <a:solidFill>
+                          <a:prstClr val="white"/>
+                        </a:solidFill>
+                        <a:effectLst/>
+                        <a:uLnTx/>
+                        <a:uFillTx/>
+                        <a:latin typeface="Calibri" panose="020F0502020204030204"/>
+                        <a:ea typeface="+mn-ea"/>
+                        <a:cs typeface="Cordia New" panose="020B0304020202020204" pitchFamily="34" charset="-34"/>
+                      </a:endParaRPr>
+                    </a:p>
+                  </a:txBody>
+                  <a:tcPr anchor="ctr">
+                    <a:solidFill>
+                      <a:srgbClr val="04AA6D"/>
+                    </a:solidFill>
+                  </a:tcPr>
+                </a:tc>
+                <a:tc>
+                  <a:txBody>
+                    <a:bodyPr/>
+                    <a:lstStyle/>
+                    <a:p>
+                      <a:pPr marL="0" marR="0" lvl="0" indent="0" algn="l" defTabSz="914400" rtl="0" eaLnBrk="1" fontAlgn="auto" latinLnBrk="0" hangingPunct="1">
+                        <a:lnSpc>
+                          <a:spcPct val="100000"/>
+                        </a:lnSpc>
+                        <a:spcBef>
+                          <a:spcPts val="0"/>
+                        </a:spcBef>
+                        <a:spcAft>
+                          <a:spcPts val="0"/>
+                        </a:spcAft>
+                        <a:buClrTx/>
+                        <a:buSzTx/>
+                        <a:buFontTx/>
+                        <a:buNone/>
+                        <a:tabLst/>
+                        <a:defRPr/>
+                      </a:pPr>
+                      <a:r>
+                        <a:rPr kumimoji="0" lang="en-US" sz="1200" b="1" i="0" u="none" strike="noStrike" kern="1200" cap="none" spc="0" normalizeH="0" baseline="0" noProof="0" dirty="0">
+                          <a:ln>
+                            <a:noFill/>
+                          </a:ln>
+                          <a:solidFill>
+                            <a:prstClr val="white"/>
+                          </a:solidFill>
+                          <a:effectLst/>
+                          <a:uLnTx/>
+                          <a:uFillTx/>
+                          <a:latin typeface="Calibri" panose="020F0502020204030204"/>
+                          <a:ea typeface="+mn-ea"/>
+                          <a:cs typeface="+mn-cs"/>
+                        </a:rPr>
+                        <a:t>Lysim_Z4</a:t>
+                      </a:r>
+                      <a:endParaRPr kumimoji="0" lang="th-TH" sz="1200" b="1" i="0" u="none" strike="noStrike" kern="1200" cap="none" spc="0" normalizeH="0" baseline="0" noProof="0" dirty="0">
+                        <a:ln>
+                          <a:noFill/>
+                        </a:ln>
+                        <a:solidFill>
+                          <a:prstClr val="white"/>
+                        </a:solidFill>
+                        <a:effectLst/>
+                        <a:uLnTx/>
+                        <a:uFillTx/>
+                        <a:latin typeface="Calibri" panose="020F0502020204030204"/>
+                        <a:ea typeface="+mn-ea"/>
+                        <a:cs typeface="Cordia New" panose="020B0304020202020204" pitchFamily="34" charset="-34"/>
+                      </a:endParaRPr>
+                    </a:p>
+                  </a:txBody>
+                  <a:tcPr anchor="ctr">
+                    <a:solidFill>
+                      <a:srgbClr val="04AA6D"/>
+                    </a:solidFill>
+                  </a:tcPr>
+                </a:tc>
+                <a:tc>
+                  <a:txBody>
+                    <a:bodyPr/>
+                    <a:lstStyle/>
+                    <a:p>
+                      <a:pPr marL="0" marR="0" lvl="0" indent="0" algn="l" defTabSz="914400" rtl="0" eaLnBrk="1" fontAlgn="auto" latinLnBrk="0" hangingPunct="1">
+                        <a:lnSpc>
+                          <a:spcPct val="100000"/>
+                        </a:lnSpc>
+                        <a:spcBef>
+                          <a:spcPts val="0"/>
+                        </a:spcBef>
+                        <a:spcAft>
+                          <a:spcPts val="0"/>
+                        </a:spcAft>
+                        <a:buClrTx/>
+                        <a:buSzTx/>
+                        <a:buFontTx/>
+                        <a:buNone/>
+                        <a:tabLst/>
+                        <a:defRPr/>
+                      </a:pPr>
+                      <a:r>
+                        <a:rPr kumimoji="0" lang="en-US" sz="1200" b="1" i="0" u="none" strike="noStrike" kern="1200" cap="none" spc="0" normalizeH="0" baseline="0" noProof="0" dirty="0">
+                          <a:ln>
+                            <a:noFill/>
+                          </a:ln>
+                          <a:solidFill>
+                            <a:prstClr val="white"/>
+                          </a:solidFill>
+                          <a:effectLst/>
+                          <a:uLnTx/>
+                          <a:uFillTx/>
+                          <a:latin typeface="Calibri" panose="020F0502020204030204"/>
+                          <a:ea typeface="+mn-ea"/>
+                          <a:cs typeface="+mn-cs"/>
+                        </a:rPr>
+                        <a:t>Lysim_Z5</a:t>
+                      </a:r>
+                      <a:endParaRPr kumimoji="0" lang="th-TH" sz="1200" b="1" i="0" u="none" strike="noStrike" kern="1200" cap="none" spc="0" normalizeH="0" baseline="0" noProof="0" dirty="0">
+                        <a:ln>
+                          <a:noFill/>
+                        </a:ln>
+                        <a:solidFill>
+                          <a:prstClr val="white"/>
+                        </a:solidFill>
+                        <a:effectLst/>
+                        <a:uLnTx/>
+                        <a:uFillTx/>
+                        <a:latin typeface="Calibri" panose="020F0502020204030204"/>
+                        <a:ea typeface="+mn-ea"/>
+                        <a:cs typeface="Cordia New" panose="020B0304020202020204" pitchFamily="34" charset="-34"/>
+                      </a:endParaRPr>
+                    </a:p>
+                  </a:txBody>
+                  <a:tcPr anchor="ctr">
+                    <a:solidFill>
+                      <a:srgbClr val="04AA6D"/>
+                    </a:solidFill>
+                  </a:tcPr>
+                </a:tc>
+                <a:tc>
+                  <a:txBody>
+                    <a:bodyPr/>
+                    <a:lstStyle/>
+                    <a:p>
+                      <a:pPr marL="0" marR="0" lvl="0" indent="0" algn="l" defTabSz="914400" rtl="0" eaLnBrk="1" fontAlgn="auto" latinLnBrk="0" hangingPunct="1">
+                        <a:lnSpc>
+                          <a:spcPct val="100000"/>
+                        </a:lnSpc>
+                        <a:spcBef>
+                          <a:spcPts val="0"/>
+                        </a:spcBef>
+                        <a:spcAft>
+                          <a:spcPts val="0"/>
+                        </a:spcAft>
+                        <a:buClrTx/>
+                        <a:buSzTx/>
+                        <a:buFontTx/>
+                        <a:buNone/>
+                        <a:tabLst/>
+                        <a:defRPr/>
+                      </a:pPr>
+                      <a:r>
+                        <a:rPr kumimoji="0" lang="en-US" sz="1200" b="1" i="0" u="none" strike="noStrike" kern="1200" cap="none" spc="0" normalizeH="0" baseline="0" noProof="0" dirty="0">
+                          <a:ln>
+                            <a:noFill/>
+                          </a:ln>
+                          <a:solidFill>
+                            <a:prstClr val="white"/>
+                          </a:solidFill>
+                          <a:effectLst/>
+                          <a:uLnTx/>
+                          <a:uFillTx/>
+                          <a:latin typeface="Calibri" panose="020F0502020204030204"/>
+                          <a:ea typeface="+mn-ea"/>
+                          <a:cs typeface="+mn-cs"/>
+                        </a:rPr>
+                        <a:t>Lysim_Z6</a:t>
+                      </a:r>
+                      <a:endParaRPr kumimoji="0" lang="th-TH" sz="1200" b="1" i="0" u="none" strike="noStrike" kern="1200" cap="none" spc="0" normalizeH="0" baseline="0" noProof="0" dirty="0">
+                        <a:ln>
+                          <a:noFill/>
+                        </a:ln>
+                        <a:solidFill>
+                          <a:prstClr val="white"/>
+                        </a:solidFill>
+                        <a:effectLst/>
+                        <a:uLnTx/>
+                        <a:uFillTx/>
+                        <a:latin typeface="Calibri" panose="020F0502020204030204"/>
+                        <a:ea typeface="+mn-ea"/>
+                        <a:cs typeface="Cordia New" panose="020B0304020202020204" pitchFamily="34" charset="-34"/>
+                      </a:endParaRPr>
+                    </a:p>
+                  </a:txBody>
+                  <a:tcPr anchor="ctr">
+                    <a:solidFill>
+                      <a:srgbClr val="04AA6D"/>
+                    </a:solidFill>
+                  </a:tcPr>
+                </a:tc>
+                <a:tc>
+                  <a:txBody>
+                    <a:bodyPr/>
+                    <a:lstStyle/>
+                    <a:p>
+                      <a:pPr marL="0" marR="0" lvl="0" indent="0" algn="l" defTabSz="914400" rtl="0" eaLnBrk="1" fontAlgn="auto" latinLnBrk="0" hangingPunct="1">
+                        <a:lnSpc>
+                          <a:spcPct val="100000"/>
+                        </a:lnSpc>
+                        <a:spcBef>
+                          <a:spcPts val="0"/>
+                        </a:spcBef>
+                        <a:spcAft>
+                          <a:spcPts val="0"/>
+                        </a:spcAft>
+                        <a:buClrTx/>
+                        <a:buSzTx/>
+                        <a:buFontTx/>
+                        <a:buNone/>
+                        <a:tabLst/>
+                        <a:defRPr/>
+                      </a:pPr>
+                      <a:r>
+                        <a:rPr kumimoji="0" lang="en-US" sz="1200" b="1" i="0" u="none" strike="noStrike" kern="1200" cap="none" spc="0" normalizeH="0" baseline="0" noProof="0" dirty="0">
+                          <a:ln>
+                            <a:noFill/>
+                          </a:ln>
+                          <a:solidFill>
+                            <a:prstClr val="white"/>
+                          </a:solidFill>
+                          <a:effectLst/>
+                          <a:uLnTx/>
+                          <a:uFillTx/>
+                          <a:latin typeface="Calibri" panose="020F0502020204030204"/>
+                          <a:ea typeface="+mn-ea"/>
+                          <a:cs typeface="+mn-cs"/>
+                        </a:rPr>
+                        <a:t>Lysim_Z7</a:t>
+                      </a:r>
+                      <a:endParaRPr kumimoji="0" lang="th-TH" sz="1200" b="1" i="0" u="none" strike="noStrike" kern="1200" cap="none" spc="0" normalizeH="0" baseline="0" noProof="0" dirty="0">
+                        <a:ln>
+                          <a:noFill/>
+                        </a:ln>
+                        <a:solidFill>
+                          <a:prstClr val="white"/>
+                        </a:solidFill>
+                        <a:effectLst/>
+                        <a:uLnTx/>
+                        <a:uFillTx/>
+                        <a:latin typeface="Calibri" panose="020F0502020204030204"/>
+                        <a:ea typeface="+mn-ea"/>
+                        <a:cs typeface="Cordia New" panose="020B0304020202020204" pitchFamily="34" charset="-34"/>
+                      </a:endParaRPr>
+                    </a:p>
+                  </a:txBody>
+                  <a:tcPr anchor="ctr">
+                    <a:solidFill>
+                      <a:srgbClr val="04AA6D"/>
+                    </a:solidFill>
+                  </a:tcPr>
+                </a:tc>
+                <a:tc>
+                  <a:txBody>
+                    <a:bodyPr/>
+                    <a:lstStyle/>
+                    <a:p>
+                      <a:pPr marL="0" marR="0" lvl="0" indent="0" algn="l" defTabSz="914400" rtl="0" eaLnBrk="1" fontAlgn="auto" latinLnBrk="0" hangingPunct="1">
+                        <a:lnSpc>
+                          <a:spcPct val="100000"/>
+                        </a:lnSpc>
+                        <a:spcBef>
+                          <a:spcPts val="0"/>
+                        </a:spcBef>
+                        <a:spcAft>
+                          <a:spcPts val="0"/>
+                        </a:spcAft>
+                        <a:buClrTx/>
+                        <a:buSzTx/>
+                        <a:buFontTx/>
+                        <a:buNone/>
+                        <a:tabLst/>
+                        <a:defRPr/>
+                      </a:pPr>
+                      <a:r>
+                        <a:rPr kumimoji="0" lang="en-US" sz="1200" b="1" i="0" u="none" strike="noStrike" kern="1200" cap="none" spc="0" normalizeH="0" baseline="0" noProof="0" dirty="0">
+                          <a:ln>
+                            <a:noFill/>
+                          </a:ln>
+                          <a:solidFill>
+                            <a:prstClr val="white"/>
+                          </a:solidFill>
+                          <a:effectLst/>
+                          <a:uLnTx/>
+                          <a:uFillTx/>
+                          <a:latin typeface="Calibri" panose="020F0502020204030204"/>
+                          <a:ea typeface="+mn-ea"/>
+                          <a:cs typeface="+mn-cs"/>
+                        </a:rPr>
+                        <a:t>Lysim_Z8</a:t>
+                      </a:r>
+                      <a:endParaRPr kumimoji="0" lang="th-TH" sz="1200" b="1" i="0" u="none" strike="noStrike" kern="1200" cap="none" spc="0" normalizeH="0" baseline="0" noProof="0" dirty="0">
+                        <a:ln>
+                          <a:noFill/>
+                        </a:ln>
+                        <a:solidFill>
+                          <a:prstClr val="white"/>
+                        </a:solidFill>
+                        <a:effectLst/>
+                        <a:uLnTx/>
+                        <a:uFillTx/>
+                        <a:latin typeface="Calibri" panose="020F0502020204030204"/>
+                        <a:ea typeface="+mn-ea"/>
+                        <a:cs typeface="Cordia New" panose="020B0304020202020204" pitchFamily="34" charset="-34"/>
+                      </a:endParaRPr>
+                    </a:p>
+                  </a:txBody>
+                  <a:tcPr anchor="ctr">
+                    <a:solidFill>
+                      <a:srgbClr val="04AA6D"/>
+                    </a:solidFill>
+                  </a:tcPr>
+                </a:tc>
+                <a:tc>
+                  <a:txBody>
+                    <a:bodyPr/>
+                    <a:lstStyle/>
+                    <a:p>
+                      <a:pPr marL="0" marR="0" lvl="0" indent="0" algn="l" defTabSz="914400" rtl="0" eaLnBrk="1" fontAlgn="auto" latinLnBrk="0" hangingPunct="1">
+                        <a:lnSpc>
+                          <a:spcPct val="100000"/>
+                        </a:lnSpc>
+                        <a:spcBef>
+                          <a:spcPts val="0"/>
+                        </a:spcBef>
+                        <a:spcAft>
+                          <a:spcPts val="0"/>
+                        </a:spcAft>
+                        <a:buClrTx/>
+                        <a:buSzTx/>
+                        <a:buFontTx/>
+                        <a:buNone/>
+                        <a:tabLst/>
+                        <a:defRPr/>
+                      </a:pPr>
+                      <a:r>
+                        <a:rPr kumimoji="0" lang="en-US" sz="1200" b="1" i="0" u="none" strike="noStrike" kern="1200" cap="none" spc="0" normalizeH="0" baseline="0" noProof="0" dirty="0">
+                          <a:ln>
+                            <a:noFill/>
+                          </a:ln>
+                          <a:solidFill>
+                            <a:prstClr val="white"/>
+                          </a:solidFill>
+                          <a:effectLst/>
+                          <a:uLnTx/>
+                          <a:uFillTx/>
+                          <a:latin typeface="Calibri" panose="020F0502020204030204"/>
+                          <a:ea typeface="+mn-ea"/>
+                          <a:cs typeface="+mn-cs"/>
+                        </a:rPr>
+                        <a:t>Lysim_Z9</a:t>
+                      </a:r>
+                      <a:endParaRPr kumimoji="0" lang="th-TH" sz="1200" b="1" i="0" u="none" strike="noStrike" kern="1200" cap="none" spc="0" normalizeH="0" baseline="0" noProof="0" dirty="0">
+                        <a:ln>
+                          <a:noFill/>
+                        </a:ln>
+                        <a:solidFill>
+                          <a:prstClr val="white"/>
+                        </a:solidFill>
+                        <a:effectLst/>
+                        <a:uLnTx/>
+                        <a:uFillTx/>
+                        <a:latin typeface="Calibri" panose="020F0502020204030204"/>
+                        <a:ea typeface="+mn-ea"/>
+                        <a:cs typeface="Cordia New" panose="020B0304020202020204" pitchFamily="34" charset="-34"/>
+                      </a:endParaRPr>
+                    </a:p>
+                  </a:txBody>
+                  <a:tcPr anchor="ctr">
+                    <a:solidFill>
+                      <a:srgbClr val="04AA6D"/>
+                    </a:solidFill>
+                  </a:tcPr>
+                </a:tc>
+                <a:tc>
+                  <a:txBody>
+                    <a:bodyPr/>
+                    <a:lstStyle/>
+                    <a:p>
+                      <a:pPr marL="0" marR="0" lvl="0" indent="0" algn="l" defTabSz="914400" rtl="0" eaLnBrk="1" fontAlgn="auto" latinLnBrk="0" hangingPunct="1">
+                        <a:lnSpc>
+                          <a:spcPct val="100000"/>
+                        </a:lnSpc>
+                        <a:spcBef>
+                          <a:spcPts val="0"/>
+                        </a:spcBef>
+                        <a:spcAft>
+                          <a:spcPts val="0"/>
+                        </a:spcAft>
+                        <a:buClrTx/>
+                        <a:buSzTx/>
+                        <a:buFontTx/>
+                        <a:buNone/>
+                        <a:tabLst/>
+                        <a:defRPr/>
+                      </a:pPr>
+                      <a:r>
+                        <a:rPr kumimoji="0" lang="en-US" sz="1200" b="1" i="0" u="none" strike="noStrike" kern="1200" cap="none" spc="0" normalizeH="0" baseline="0" noProof="0" dirty="0">
+                          <a:ln>
+                            <a:noFill/>
+                          </a:ln>
+                          <a:solidFill>
+                            <a:prstClr val="white"/>
+                          </a:solidFill>
+                          <a:effectLst/>
+                          <a:uLnTx/>
+                          <a:uFillTx/>
+                          <a:latin typeface="Calibri" panose="020F0502020204030204"/>
+                          <a:ea typeface="+mn-ea"/>
+                          <a:cs typeface="+mn-cs"/>
+                        </a:rPr>
+                        <a:t>Lysim_Z10</a:t>
+                      </a:r>
+                      <a:endParaRPr kumimoji="0" lang="th-TH" sz="1200" b="1" i="0" u="none" strike="noStrike" kern="1200" cap="none" spc="0" normalizeH="0" baseline="0" noProof="0" dirty="0">
+                        <a:ln>
+                          <a:noFill/>
+                        </a:ln>
+                        <a:solidFill>
+                          <a:prstClr val="white"/>
+                        </a:solidFill>
+                        <a:effectLst/>
+                        <a:uLnTx/>
+                        <a:uFillTx/>
+                        <a:latin typeface="Calibri" panose="020F0502020204030204"/>
+                        <a:ea typeface="+mn-ea"/>
+                        <a:cs typeface="Cordia New" panose="020B0304020202020204" pitchFamily="34" charset="-34"/>
+                      </a:endParaRPr>
+                    </a:p>
+                  </a:txBody>
+                  <a:tcPr anchor="ctr">
+                    <a:solidFill>
+                      <a:srgbClr val="04AA6D"/>
+                    </a:solidFill>
+                  </a:tcPr>
+                </a:tc>
+                <a:tc>
+                  <a:txBody>
+                    <a:bodyPr/>
+                    <a:lstStyle/>
+                    <a:p>
+                      <a:pPr marL="0" marR="0" lvl="0" indent="0" algn="l" defTabSz="914400" rtl="0" eaLnBrk="1" fontAlgn="auto" latinLnBrk="0" hangingPunct="1">
+                        <a:lnSpc>
+                          <a:spcPct val="100000"/>
+                        </a:lnSpc>
+                        <a:spcBef>
+                          <a:spcPts val="0"/>
+                        </a:spcBef>
+                        <a:spcAft>
+                          <a:spcPts val="0"/>
+                        </a:spcAft>
+                        <a:buClrTx/>
+                        <a:buSzTx/>
+                        <a:buFontTx/>
+                        <a:buNone/>
+                        <a:tabLst/>
+                        <a:defRPr/>
+                      </a:pPr>
+                      <a:r>
+                        <a:rPr kumimoji="0" lang="en-US" sz="1200" b="1" i="0" u="none" strike="noStrike" kern="1200" cap="none" spc="0" normalizeH="0" baseline="0" noProof="0" dirty="0">
+                          <a:ln>
+                            <a:noFill/>
+                          </a:ln>
+                          <a:solidFill>
+                            <a:prstClr val="white"/>
+                          </a:solidFill>
+                          <a:effectLst/>
+                          <a:uLnTx/>
+                          <a:uFillTx/>
+                          <a:latin typeface="Calibri" panose="020F0502020204030204"/>
+                          <a:ea typeface="+mn-ea"/>
+                          <a:cs typeface="+mn-cs"/>
+                        </a:rPr>
+                        <a:t>Lysim_Z11</a:t>
+                      </a:r>
+                      <a:endParaRPr kumimoji="0" lang="th-TH" sz="1200" b="1" i="0" u="none" strike="noStrike" kern="1200" cap="none" spc="0" normalizeH="0" baseline="0" noProof="0" dirty="0">
+                        <a:ln>
+                          <a:noFill/>
+                        </a:ln>
+                        <a:solidFill>
+                          <a:prstClr val="white"/>
+                        </a:solidFill>
+                        <a:effectLst/>
+                        <a:uLnTx/>
+                        <a:uFillTx/>
+                        <a:latin typeface="+mn-lt"/>
+                        <a:ea typeface="+mn-ea"/>
+                        <a:cs typeface="+mn-cs"/>
+                      </a:endParaRPr>
+                    </a:p>
+                  </a:txBody>
+                  <a:tcPr anchor="ctr">
+                    <a:solidFill>
+                      <a:srgbClr val="04AA6D"/>
+                    </a:solidFill>
+                  </a:tcPr>
+                </a:tc>
+                <a:tc>
+                  <a:txBody>
+                    <a:bodyPr/>
+                    <a:lstStyle/>
+                    <a:p>
+                      <a:pPr marL="0" marR="0" lvl="0" indent="0" algn="l" defTabSz="914400" rtl="0" eaLnBrk="1" fontAlgn="auto" latinLnBrk="0" hangingPunct="1">
+                        <a:lnSpc>
+                          <a:spcPct val="100000"/>
+                        </a:lnSpc>
+                        <a:spcBef>
+                          <a:spcPts val="0"/>
+                        </a:spcBef>
+                        <a:spcAft>
+                          <a:spcPts val="0"/>
+                        </a:spcAft>
+                        <a:buClrTx/>
+                        <a:buSzTx/>
+                        <a:buFontTx/>
+                        <a:buNone/>
+                        <a:tabLst/>
+                        <a:defRPr/>
+                      </a:pPr>
+                      <a:r>
+                        <a:rPr kumimoji="0" lang="en-US" sz="1200" b="1" i="0" u="none" strike="noStrike" kern="1200" cap="none" spc="0" normalizeH="0" baseline="0" noProof="0" dirty="0">
+                          <a:ln>
+                            <a:noFill/>
+                          </a:ln>
+                          <a:solidFill>
+                            <a:prstClr val="white"/>
+                          </a:solidFill>
+                          <a:effectLst/>
+                          <a:uLnTx/>
+                          <a:uFillTx/>
+                          <a:latin typeface="Calibri" panose="020F0502020204030204"/>
+                          <a:ea typeface="+mn-ea"/>
+                          <a:cs typeface="+mn-cs"/>
+                        </a:rPr>
+                        <a:t>Lysim_Z12</a:t>
+                      </a:r>
+                      <a:endParaRPr kumimoji="0" lang="th-TH" sz="1200" b="1" i="0" u="none" strike="noStrike" kern="1200" cap="none" spc="0" normalizeH="0" baseline="0" noProof="0" dirty="0">
+                        <a:ln>
+                          <a:noFill/>
+                        </a:ln>
+                        <a:solidFill>
+                          <a:prstClr val="white"/>
+                        </a:solidFill>
+                        <a:effectLst/>
+                        <a:uLnTx/>
+                        <a:uFillTx/>
+                        <a:latin typeface="Calibri" panose="020F0502020204030204"/>
+                        <a:ea typeface="+mn-ea"/>
+                        <a:cs typeface="Cordia New" panose="020B0304020202020204" pitchFamily="34" charset="-34"/>
+                      </a:endParaRPr>
+                    </a:p>
+                  </a:txBody>
+                  <a:tcPr anchor="ctr">
+                    <a:solidFill>
+                      <a:srgbClr val="04AA6D"/>
+                    </a:solidFill>
+                  </a:tcPr>
+                </a:tc>
+                <a:tc>
+                  <a:txBody>
+                    <a:bodyPr/>
+                    <a:lstStyle/>
+                    <a:p>
+                      <a:pPr marL="0" marR="0" lvl="0" indent="0" algn="l" defTabSz="914400" rtl="0" eaLnBrk="1" fontAlgn="auto" latinLnBrk="0" hangingPunct="1">
+                        <a:lnSpc>
+                          <a:spcPct val="100000"/>
+                        </a:lnSpc>
+                        <a:spcBef>
+                          <a:spcPts val="0"/>
+                        </a:spcBef>
+                        <a:spcAft>
+                          <a:spcPts val="0"/>
+                        </a:spcAft>
+                        <a:buClrTx/>
+                        <a:buSzTx/>
+                        <a:buFontTx/>
+                        <a:buNone/>
+                        <a:tabLst/>
+                        <a:defRPr/>
+                      </a:pPr>
+                      <a:r>
+                        <a:rPr kumimoji="0" lang="en-US" sz="1200" b="1" i="0" u="none" strike="noStrike" kern="1200" cap="none" spc="0" normalizeH="0" baseline="0" noProof="0" dirty="0">
+                          <a:ln>
+                            <a:noFill/>
+                          </a:ln>
+                          <a:solidFill>
+                            <a:prstClr val="white"/>
+                          </a:solidFill>
+                          <a:effectLst/>
+                          <a:uLnTx/>
+                          <a:uFillTx/>
+                          <a:latin typeface="Calibri" panose="020F0502020204030204"/>
+                          <a:ea typeface="+mn-ea"/>
+                          <a:cs typeface="+mn-cs"/>
+                        </a:rPr>
+                        <a:t>Lysim_Z13</a:t>
+                      </a:r>
+                      <a:endParaRPr kumimoji="0" lang="th-TH" sz="1200" b="1" i="0" u="none" strike="noStrike" kern="1200" cap="none" spc="0" normalizeH="0" baseline="0" noProof="0" dirty="0">
+                        <a:ln>
+                          <a:noFill/>
+                        </a:ln>
+                        <a:solidFill>
+                          <a:prstClr val="white"/>
+                        </a:solidFill>
+                        <a:effectLst/>
+                        <a:uLnTx/>
+                        <a:uFillTx/>
+                        <a:latin typeface="Calibri" panose="020F0502020204030204"/>
+                        <a:ea typeface="+mn-ea"/>
+                        <a:cs typeface="Cordia New" panose="020B0304020202020204" pitchFamily="34" charset="-34"/>
+                      </a:endParaRPr>
+                    </a:p>
+                  </a:txBody>
+                  <a:tcPr anchor="ctr">
+                    <a:solidFill>
+                      <a:srgbClr val="04AA6D"/>
+                    </a:solidFill>
+                  </a:tcPr>
+                </a:tc>
+                <a:tc>
+                  <a:txBody>
+                    <a:bodyPr/>
+                    <a:lstStyle/>
+                    <a:p>
+                      <a:pPr marL="0" marR="0" lvl="0" indent="0" algn="l" defTabSz="914400" rtl="0" eaLnBrk="1" fontAlgn="auto" latinLnBrk="0" hangingPunct="1">
+                        <a:lnSpc>
+                          <a:spcPct val="100000"/>
+                        </a:lnSpc>
+                        <a:spcBef>
+                          <a:spcPts val="0"/>
+                        </a:spcBef>
+                        <a:spcAft>
+                          <a:spcPts val="0"/>
+                        </a:spcAft>
+                        <a:buClrTx/>
+                        <a:buSzTx/>
+                        <a:buFontTx/>
+                        <a:buNone/>
+                        <a:tabLst/>
+                        <a:defRPr/>
+                      </a:pPr>
+                      <a:r>
+                        <a:rPr kumimoji="0" lang="en-US" sz="1200" b="1" i="0" u="none" strike="noStrike" kern="1200" cap="none" spc="0" normalizeH="0" baseline="0" noProof="0" dirty="0">
+                          <a:ln>
+                            <a:noFill/>
+                          </a:ln>
+                          <a:solidFill>
+                            <a:prstClr val="white"/>
+                          </a:solidFill>
+                          <a:effectLst/>
+                          <a:uLnTx/>
+                          <a:uFillTx/>
+                          <a:latin typeface="Calibri" panose="020F0502020204030204"/>
+                          <a:ea typeface="+mn-ea"/>
+                          <a:cs typeface="+mn-cs"/>
+                        </a:rPr>
+                        <a:t>Lysim_Z14</a:t>
+                      </a:r>
+                      <a:endParaRPr kumimoji="0" lang="th-TH" sz="1200" b="1" i="0" u="none" strike="noStrike" kern="1200" cap="none" spc="0" normalizeH="0" baseline="0" noProof="0" dirty="0">
+                        <a:ln>
+                          <a:noFill/>
+                        </a:ln>
+                        <a:solidFill>
+                          <a:prstClr val="white"/>
+                        </a:solidFill>
+                        <a:effectLst/>
+                        <a:uLnTx/>
+                        <a:uFillTx/>
+                        <a:latin typeface="Calibri" panose="020F0502020204030204"/>
+                        <a:ea typeface="+mn-ea"/>
+                        <a:cs typeface="Cordia New" panose="020B0304020202020204" pitchFamily="34" charset="-34"/>
+                      </a:endParaRPr>
+                    </a:p>
+                  </a:txBody>
+                  <a:tcPr anchor="ctr">
+                    <a:solidFill>
+                      <a:srgbClr val="04AA6D"/>
+                    </a:solidFill>
+                  </a:tcPr>
+                </a:tc>
+                <a:tc>
+                  <a:txBody>
+                    <a:bodyPr/>
+                    <a:lstStyle/>
+                    <a:p>
+                      <a:pPr marL="0" marR="0" lvl="0" indent="0" algn="l" defTabSz="914400" rtl="0" eaLnBrk="1" fontAlgn="auto" latinLnBrk="0" hangingPunct="1">
+                        <a:lnSpc>
+                          <a:spcPct val="100000"/>
+                        </a:lnSpc>
+                        <a:spcBef>
+                          <a:spcPts val="0"/>
+                        </a:spcBef>
+                        <a:spcAft>
+                          <a:spcPts val="0"/>
+                        </a:spcAft>
+                        <a:buClrTx/>
+                        <a:buSzTx/>
+                        <a:buFontTx/>
+                        <a:buNone/>
+                        <a:tabLst/>
+                        <a:defRPr/>
+                      </a:pPr>
+                      <a:r>
+                        <a:rPr kumimoji="0" lang="en-US" sz="1200" b="1" i="0" u="none" strike="noStrike" kern="1200" cap="none" spc="0" normalizeH="0" baseline="0" noProof="0" dirty="0">
+                          <a:ln>
+                            <a:noFill/>
+                          </a:ln>
+                          <a:solidFill>
+                            <a:prstClr val="white"/>
+                          </a:solidFill>
+                          <a:effectLst/>
+                          <a:uLnTx/>
+                          <a:uFillTx/>
+                          <a:latin typeface="Calibri" panose="020F0502020204030204"/>
+                          <a:ea typeface="+mn-ea"/>
+                          <a:cs typeface="+mn-cs"/>
+                        </a:rPr>
+                        <a:t>Lysim_Z15</a:t>
+                      </a:r>
+                      <a:endParaRPr kumimoji="0" lang="th-TH" sz="1200" b="1" i="0" u="none" strike="noStrike" kern="1200" cap="none" spc="0" normalizeH="0" baseline="0" noProof="0" dirty="0">
+                        <a:ln>
+                          <a:noFill/>
+                        </a:ln>
+                        <a:solidFill>
+                          <a:prstClr val="white"/>
+                        </a:solidFill>
+                        <a:effectLst/>
+                        <a:uLnTx/>
+                        <a:uFillTx/>
+                        <a:latin typeface="+mn-lt"/>
+                        <a:ea typeface="+mn-ea"/>
+                        <a:cs typeface="+mn-cs"/>
+                      </a:endParaRPr>
+                    </a:p>
+                  </a:txBody>
+                  <a:tcPr anchor="ctr">
+                    <a:solidFill>
+                      <a:srgbClr val="04AA6D"/>
+                    </a:solidFill>
+                  </a:tcPr>
+                </a:tc>
+                <a:tc>
+                  <a:txBody>
+                    <a:bodyPr/>
+                    <a:lstStyle/>
+                    <a:p>
+                      <a:pPr marL="0" marR="0" lvl="0" indent="0" algn="l" defTabSz="914400" rtl="0" eaLnBrk="1" fontAlgn="auto" latinLnBrk="0" hangingPunct="1">
+                        <a:lnSpc>
+                          <a:spcPct val="100000"/>
+                        </a:lnSpc>
+                        <a:spcBef>
+                          <a:spcPts val="0"/>
+                        </a:spcBef>
+                        <a:spcAft>
+                          <a:spcPts val="0"/>
+                        </a:spcAft>
+                        <a:buClrTx/>
+                        <a:buSzTx/>
+                        <a:buFontTx/>
+                        <a:buNone/>
+                        <a:tabLst/>
+                        <a:defRPr/>
+                      </a:pPr>
+                      <a:r>
+                        <a:rPr kumimoji="0" lang="en-US" sz="1200" b="1" i="0" u="none" strike="noStrike" kern="1200" cap="none" spc="0" normalizeH="0" baseline="0" noProof="0" dirty="0">
+                          <a:ln>
+                            <a:noFill/>
+                          </a:ln>
+                          <a:solidFill>
+                            <a:prstClr val="white"/>
+                          </a:solidFill>
+                          <a:effectLst/>
+                          <a:uLnTx/>
+                          <a:uFillTx/>
+                          <a:latin typeface="Calibri" panose="020F0502020204030204"/>
+                          <a:ea typeface="+mn-ea"/>
+                          <a:cs typeface="+mn-cs"/>
+                        </a:rPr>
+                        <a:t>Lysim_Z16</a:t>
+                      </a:r>
+                      <a:endParaRPr kumimoji="0" lang="th-TH" sz="1200" b="1" i="0" u="none" strike="noStrike" kern="1200" cap="none" spc="0" normalizeH="0" baseline="0" noProof="0" dirty="0">
+                        <a:ln>
+                          <a:noFill/>
+                        </a:ln>
+                        <a:solidFill>
+                          <a:prstClr val="white"/>
+                        </a:solidFill>
+                        <a:effectLst/>
+                        <a:uLnTx/>
+                        <a:uFillTx/>
+                        <a:latin typeface="Calibri" panose="020F0502020204030204"/>
+                        <a:ea typeface="+mn-ea"/>
+                        <a:cs typeface="Cordia New" panose="020B0304020202020204" pitchFamily="34" charset="-34"/>
+                      </a:endParaRPr>
+                    </a:p>
+                  </a:txBody>
+                  <a:tcPr anchor="ctr">
+                    <a:solidFill>
+                      <a:srgbClr val="04AA6D"/>
+                    </a:solidFill>
+                  </a:tcPr>
+                </a:tc>
+                <a:extLst>
+                  <a:ext uri="{0D108BD9-81ED-4DB2-BD59-A6C34878D82A}">
+                    <a16:rowId xmlns:a16="http://schemas.microsoft.com/office/drawing/2014/main" val="3837336238"/>
+                  </a:ext>
+                </a:extLst>
+              </a:tr>
+            </a:tbl>
+          </a:graphicData>
+        </a:graphic>
+      </p:graphicFrame>
+      <p:sp>
+        <p:nvSpPr>
+          <p:cNvPr id="10" name="กล่องข้อความ 9">
+            <a:extLst>
+              <a:ext uri="{FF2B5EF4-FFF2-40B4-BE49-F238E27FC236}">
+                <a16:creationId xmlns:a16="http://schemas.microsoft.com/office/drawing/2014/main" id="{35DA22EE-A889-4751-8527-FB4B17120BCC}"/>
+              </a:ext>
+            </a:extLst>
+          </p:cNvPr>
+          <p:cNvSpPr txBox="1"/>
+          <p:nvPr/>
+        </p:nvSpPr>
+        <p:spPr>
+          <a:xfrm>
+            <a:off x="2365664" y="4941387"/>
+            <a:ext cx="4731328" cy="646331"/>
+          </a:xfrm>
+          <a:prstGeom prst="rect">
+            <a:avLst/>
+          </a:prstGeom>
+          <a:noFill/>
+          <a:ln>
+            <a:noFill/>
+          </a:ln>
+        </p:spPr>
+        <p:txBody>
+          <a:bodyPr wrap="square" rtlCol="0">
+            <a:spAutoFit/>
+          </a:bodyPr>
+          <a:lstStyle/>
+          <a:p>
+            <a:r>
+              <a:rPr lang="en-US" sz="1800" dirty="0">
+                <a:solidFill>
+                  <a:srgbClr val="FF0000"/>
+                </a:solidFill>
+              </a:rPr>
+              <a:t>UNIT</a:t>
+            </a:r>
+          </a:p>
+          <a:p>
+            <a:r>
+              <a:rPr lang="en-US" sz="1800" dirty="0" err="1">
+                <a:solidFill>
+                  <a:srgbClr val="FF0000"/>
+                </a:solidFill>
+              </a:rPr>
+              <a:t>Lysim</a:t>
+            </a:r>
+            <a:r>
+              <a:rPr lang="en-US" sz="1800" dirty="0">
+                <a:solidFill>
+                  <a:srgbClr val="FF0000"/>
+                </a:solidFill>
+              </a:rPr>
+              <a:t> : CM</a:t>
             </a:r>
           </a:p>
         </p:txBody>
@@ -3460,7 +4962,7 @@
     </p:spTree>
     <p:extLst>
       <p:ext uri="{BB962C8B-B14F-4D97-AF65-F5344CB8AC3E}">
-        <p14:creationId xmlns:p14="http://schemas.microsoft.com/office/powerpoint/2010/main" val="2076226830"/>
+        <p14:creationId xmlns:p14="http://schemas.microsoft.com/office/powerpoint/2010/main" val="3893118571"/>
       </p:ext>
     </p:extLst>
   </p:cSld>
@@ -3487,6 +4989,79 @@
           <a:chExt cx="0" cy="0"/>
         </a:xfrm>
       </p:grpSpPr>
+      <p:sp>
+        <p:nvSpPr>
+          <p:cNvPr id="9" name="กล่องข้อความ 8">
+            <a:extLst>
+              <a:ext uri="{FF2B5EF4-FFF2-40B4-BE49-F238E27FC236}">
+                <a16:creationId xmlns:a16="http://schemas.microsoft.com/office/drawing/2014/main" id="{C626A5EC-621A-4242-BFF6-7A793F20F754}"/>
+              </a:ext>
+            </a:extLst>
+          </p:cNvPr>
+          <p:cNvSpPr txBox="1"/>
+          <p:nvPr/>
+        </p:nvSpPr>
+        <p:spPr>
+          <a:xfrm>
+            <a:off x="3730336" y="2875002"/>
+            <a:ext cx="4731328" cy="1107996"/>
+          </a:xfrm>
+          <a:prstGeom prst="rect">
+            <a:avLst/>
+          </a:prstGeom>
+          <a:noFill/>
+          <a:ln>
+            <a:noFill/>
+          </a:ln>
+        </p:spPr>
+        <p:txBody>
+          <a:bodyPr wrap="square" rtlCol="0">
+            <a:spAutoFit/>
+          </a:bodyPr>
+          <a:lstStyle/>
+          <a:p>
+            <a:pPr algn="ctr"/>
+            <a:r>
+              <a:rPr lang="en-US" sz="6600" b="1" dirty="0">
+                <a:solidFill>
+                  <a:srgbClr val="FF0000"/>
+                </a:solidFill>
+              </a:rPr>
+              <a:t>ANALYSIS</a:t>
+            </a:r>
+          </a:p>
+        </p:txBody>
+      </p:sp>
+    </p:spTree>
+    <p:extLst>
+      <p:ext uri="{BB962C8B-B14F-4D97-AF65-F5344CB8AC3E}">
+        <p14:creationId xmlns:p14="http://schemas.microsoft.com/office/powerpoint/2010/main" val="2076226830"/>
+      </p:ext>
+    </p:extLst>
+  </p:cSld>
+  <p:clrMapOvr>
+    <a:masterClrMapping/>
+  </p:clrMapOvr>
+</p:sld>
+</file>
+
+<file path=ppt/slides/slide12.xml><?xml version="1.0" encoding="utf-8"?>
+<p:sld xmlns:a="http://schemas.openxmlformats.org/drawingml/2006/main" xmlns:r="http://schemas.openxmlformats.org/officeDocument/2006/relationships" xmlns:p="http://schemas.openxmlformats.org/presentationml/2006/main">
+  <p:cSld>
+    <p:spTree>
+      <p:nvGrpSpPr>
+        <p:cNvPr id="1" name=""/>
+        <p:cNvGrpSpPr/>
+        <p:nvPr/>
+      </p:nvGrpSpPr>
+      <p:grpSpPr>
+        <a:xfrm>
+          <a:off x="0" y="0"/>
+          <a:ext cx="0" cy="0"/>
+          <a:chOff x="0" y="0"/>
+          <a:chExt cx="0" cy="0"/>
+        </a:xfrm>
+      </p:grpSpPr>
       <p:pic>
         <p:nvPicPr>
           <p:cNvPr id="5122" name="Picture 2" descr="ไม่มีคำอธิบาย">
@@ -3690,7 +5265,7 @@
 </p:sld>
 </file>
 
-<file path=ppt/slides/slide12.xml><?xml version="1.0" encoding="utf-8"?>
+<file path=ppt/slides/slide13.xml><?xml version="1.0" encoding="utf-8"?>
 <p:sld xmlns:a="http://schemas.openxmlformats.org/drawingml/2006/main" xmlns:r="http://schemas.openxmlformats.org/officeDocument/2006/relationships" xmlns:p="http://schemas.openxmlformats.org/presentationml/2006/main">
   <p:cSld>
     <p:spTree>
@@ -4248,7 +5823,7 @@
 </p:sld>
 </file>
 
-<file path=ppt/slides/slide13.xml><?xml version="1.0" encoding="utf-8"?>
+<file path=ppt/slides/slide14.xml><?xml version="1.0" encoding="utf-8"?>
 <p:sld xmlns:a="http://schemas.openxmlformats.org/drawingml/2006/main" xmlns:r="http://schemas.openxmlformats.org/officeDocument/2006/relationships" xmlns:p="http://schemas.openxmlformats.org/presentationml/2006/main">
   <p:cSld>
     <p:spTree>
@@ -4746,7 +6321,7 @@
 </p:sld>
 </file>
 
-<file path=ppt/slides/slide14.xml><?xml version="1.0" encoding="utf-8"?>
+<file path=ppt/slides/slide15.xml><?xml version="1.0" encoding="utf-8"?>
 <p:sld xmlns:a="http://schemas.openxmlformats.org/drawingml/2006/main" xmlns:r="http://schemas.openxmlformats.org/officeDocument/2006/relationships" xmlns:p="http://schemas.openxmlformats.org/presentationml/2006/main">
   <p:cSld>
     <p:spTree>
@@ -4819,7 +6394,7 @@
 </p:sld>
 </file>
 
-<file path=ppt/slides/slide15.xml><?xml version="1.0" encoding="utf-8"?>
+<file path=ppt/slides/slide16.xml><?xml version="1.0" encoding="utf-8"?>
 <p:sld xmlns:a="http://schemas.openxmlformats.org/drawingml/2006/main" xmlns:r="http://schemas.openxmlformats.org/officeDocument/2006/relationships" xmlns:p="http://schemas.openxmlformats.org/presentationml/2006/main">
   <p:cSld>
     <p:spTree>
@@ -4907,7 +6482,7 @@
 </p:sld>
 </file>
 
-<file path=ppt/slides/slide16.xml><?xml version="1.0" encoding="utf-8"?>
+<file path=ppt/slides/slide17.xml><?xml version="1.0" encoding="utf-8"?>
 <p:sld xmlns:a="http://schemas.openxmlformats.org/drawingml/2006/main" xmlns:r="http://schemas.openxmlformats.org/officeDocument/2006/relationships" xmlns:p="http://schemas.openxmlformats.org/presentationml/2006/main">
   <p:cSld>
     <p:spTree>
@@ -6952,6 +8527,132 @@
 </file>
 
 <file path=ppt/slides/slide4.xml><?xml version="1.0" encoding="utf-8"?>
+<p:sld xmlns:a="http://schemas.openxmlformats.org/drawingml/2006/main" xmlns:r="http://schemas.openxmlformats.org/officeDocument/2006/relationships" xmlns:p="http://schemas.openxmlformats.org/presentationml/2006/main">
+  <p:cSld>
+    <p:spTree>
+      <p:nvGrpSpPr>
+        <p:cNvPr id="1" name=""/>
+        <p:cNvGrpSpPr/>
+        <p:nvPr/>
+      </p:nvGrpSpPr>
+      <p:grpSpPr>
+        <a:xfrm>
+          <a:off x="0" y="0"/>
+          <a:ext cx="0" cy="0"/>
+          <a:chOff x="0" y="0"/>
+          <a:chExt cx="0" cy="0"/>
+        </a:xfrm>
+      </p:grpSpPr>
+      <p:sp>
+        <p:nvSpPr>
+          <p:cNvPr id="5" name="TextBox 4">
+            <a:extLst>
+              <a:ext uri="{FF2B5EF4-FFF2-40B4-BE49-F238E27FC236}">
+                <a16:creationId xmlns:a16="http://schemas.microsoft.com/office/drawing/2014/main" id="{767B2B92-AEF2-4F87-A588-F65DADC16A74}"/>
+              </a:ext>
+            </a:extLst>
+          </p:cNvPr>
+          <p:cNvSpPr txBox="1"/>
+          <p:nvPr/>
+        </p:nvSpPr>
+        <p:spPr>
+          <a:xfrm>
+            <a:off x="374072" y="625758"/>
+            <a:ext cx="10989425" cy="2677656"/>
+          </a:xfrm>
+          <a:prstGeom prst="rect">
+            <a:avLst/>
+          </a:prstGeom>
+          <a:noFill/>
+        </p:spPr>
+        <p:txBody>
+          <a:bodyPr wrap="square">
+            <a:spAutoFit/>
+          </a:bodyPr>
+          <a:lstStyle/>
+          <a:p>
+            <a:r>
+              <a:rPr lang="en-US" sz="1200" dirty="0"/>
+              <a:t>Alternative Wetting and Drying (Responses) :</a:t>
+            </a:r>
+          </a:p>
+          <a:p>
+            <a:r>
+              <a:rPr lang="en-US" sz="1200" dirty="0">
+                <a:hlinkClick r:id="rId2"/>
+              </a:rPr>
+              <a:t>https://script.google.com/macros/s/AKfycbxpWEZxEVvlvMEJzUBq89y00ML9dpe71J7jYkQ_qyFPc35c-iPg5uszfr7Dzld6z02c/exec?action=getData</a:t>
+            </a:r>
+            <a:endParaRPr lang="en-US" sz="1200" dirty="0"/>
+          </a:p>
+          <a:p>
+            <a:endParaRPr lang="en-US" sz="1200" dirty="0"/>
+          </a:p>
+          <a:p>
+            <a:r>
+              <a:rPr lang="en-US" sz="1200" dirty="0"/>
+              <a:t>Saturated soil Irrigation (Responses) : </a:t>
+            </a:r>
+          </a:p>
+          <a:p>
+            <a:r>
+              <a:rPr lang="en-US" sz="1200" dirty="0">
+                <a:hlinkClick r:id="rId3"/>
+              </a:rPr>
+              <a:t>https://script.google.com/macros/s/AKfycbxN3VT7K0Bxw4N6breKfuvvLZQW-j9TFTQdLkGapB7REpBiJQ5ICWUWVB2UdNGiiVKsYw/exec?action=getData</a:t>
+            </a:r>
+            <a:endParaRPr lang="en-US" sz="1200" dirty="0"/>
+          </a:p>
+          <a:p>
+            <a:endParaRPr lang="en-US" sz="1200" dirty="0"/>
+          </a:p>
+          <a:p>
+            <a:r>
+              <a:rPr lang="en-US" sz="1200" dirty="0"/>
+              <a:t>Continuous Flooding (Responses) : </a:t>
+            </a:r>
+            <a:r>
+              <a:rPr lang="en-US" sz="1200" dirty="0">
+                <a:hlinkClick r:id="rId4"/>
+              </a:rPr>
+              <a:t>https://script.google.com/macros/s/AKfycbw9VEh3hp0KtFrRbfs8PdkG_0ufleVaQE8c9MnDBDKeeeqVkBkMcUrCZYi6TJxonw2VXg/exec?action=getData</a:t>
+            </a:r>
+            <a:endParaRPr lang="en-US" sz="1200" dirty="0"/>
+          </a:p>
+          <a:p>
+            <a:endParaRPr lang="en-US" sz="1200" dirty="0"/>
+          </a:p>
+          <a:p>
+            <a:endParaRPr lang="en-US" sz="1200" dirty="0"/>
+          </a:p>
+          <a:p>
+            <a:endParaRPr lang="en-US" sz="1200" dirty="0"/>
+          </a:p>
+          <a:p>
+            <a:endParaRPr lang="en-US" sz="1200" dirty="0"/>
+          </a:p>
+          <a:p>
+            <a:endParaRPr lang="en-US" sz="1200" dirty="0"/>
+          </a:p>
+          <a:p>
+            <a:endParaRPr lang="en-US" sz="1200" dirty="0"/>
+          </a:p>
+        </p:txBody>
+      </p:sp>
+    </p:spTree>
+    <p:extLst>
+      <p:ext uri="{BB962C8B-B14F-4D97-AF65-F5344CB8AC3E}">
+        <p14:creationId xmlns:p14="http://schemas.microsoft.com/office/powerpoint/2010/main" val="1261844416"/>
+      </p:ext>
+    </p:extLst>
+  </p:cSld>
+  <p:clrMapOvr>
+    <a:masterClrMapping/>
+  </p:clrMapOvr>
+</p:sld>
+</file>
+
+<file path=ppt/slides/slide5.xml><?xml version="1.0" encoding="utf-8"?>
 <p:sld xmlns:a="http://schemas.openxmlformats.org/drawingml/2006/main" xmlns:r="http://schemas.openxmlformats.org/officeDocument/2006/relationships" xmlns:p="http://schemas.openxmlformats.org/presentationml/2006/main">
   <p:cSld>
     <p:bg>
@@ -7807,7 +9508,7 @@
 </p:sld>
 </file>
 
-<file path=ppt/slides/slide5.xml><?xml version="1.0" encoding="utf-8"?>
+<file path=ppt/slides/slide6.xml><?xml version="1.0" encoding="utf-8"?>
 <p:sld xmlns:a="http://schemas.openxmlformats.org/drawingml/2006/main" xmlns:r="http://schemas.openxmlformats.org/officeDocument/2006/relationships" xmlns:p="http://schemas.openxmlformats.org/presentationml/2006/main">
   <p:cSld>
     <p:spTree>
@@ -9205,7 +10906,7 @@
 </p:sld>
 </file>
 
-<file path=ppt/slides/slide6.xml><?xml version="1.0" encoding="utf-8"?>
+<file path=ppt/slides/slide7.xml><?xml version="1.0" encoding="utf-8"?>
 <p:sld xmlns:a="http://schemas.openxmlformats.org/drawingml/2006/main" xmlns:r="http://schemas.openxmlformats.org/officeDocument/2006/relationships" xmlns:p="http://schemas.openxmlformats.org/presentationml/2006/main">
   <p:cSld>
     <p:spTree>
@@ -9278,7 +10979,7 @@
 </p:sld>
 </file>
 
-<file path=ppt/slides/slide7.xml><?xml version="1.0" encoding="utf-8"?>
+<file path=ppt/slides/slide8.xml><?xml version="1.0" encoding="utf-8"?>
 <p:sld xmlns:a="http://schemas.openxmlformats.org/drawingml/2006/main" xmlns:r="http://schemas.openxmlformats.org/officeDocument/2006/relationships" xmlns:p="http://schemas.openxmlformats.org/presentationml/2006/main">
   <p:cSld>
     <p:spTree>
@@ -12753,7 +14454,7 @@
 </p:sld>
 </file>
 
-<file path=ppt/slides/slide8.xml><?xml version="1.0" encoding="utf-8"?>
+<file path=ppt/slides/slide9.xml><?xml version="1.0" encoding="utf-8"?>
 <p:sld xmlns:a="http://schemas.openxmlformats.org/drawingml/2006/main" xmlns:r="http://schemas.openxmlformats.org/officeDocument/2006/relationships" xmlns:p="http://schemas.openxmlformats.org/presentationml/2006/main">
   <p:cSld>
     <p:spTree>
@@ -13972,1580 +15673,6 @@
 </p:sld>
 </file>
 
-<file path=ppt/slides/slide9.xml><?xml version="1.0" encoding="utf-8"?>
-<p:sld xmlns:a="http://schemas.openxmlformats.org/drawingml/2006/main" xmlns:r="http://schemas.openxmlformats.org/officeDocument/2006/relationships" xmlns:p="http://schemas.openxmlformats.org/presentationml/2006/main">
-  <p:cSld>
-    <p:spTree>
-      <p:nvGrpSpPr>
-        <p:cNvPr id="1" name=""/>
-        <p:cNvGrpSpPr/>
-        <p:nvPr/>
-      </p:nvGrpSpPr>
-      <p:grpSpPr>
-        <a:xfrm>
-          <a:off x="0" y="0"/>
-          <a:ext cx="0" cy="0"/>
-          <a:chOff x="0" y="0"/>
-          <a:chExt cx="0" cy="0"/>
-        </a:xfrm>
-      </p:grpSpPr>
-      <p:pic>
-        <p:nvPicPr>
-          <p:cNvPr id="2050" name="Picture 2" descr="ไม่มีคำอธิบาย">
-            <a:extLst>
-              <a:ext uri="{FF2B5EF4-FFF2-40B4-BE49-F238E27FC236}">
-                <a16:creationId xmlns:a16="http://schemas.microsoft.com/office/drawing/2014/main" id="{0369A667-801B-4210-B19E-064A5D9FEAE6}"/>
-              </a:ext>
-            </a:extLst>
-          </p:cNvPr>
-          <p:cNvPicPr>
-            <a:picLocks noChangeAspect="1" noChangeArrowheads="1"/>
-          </p:cNvPicPr>
-          <p:nvPr/>
-        </p:nvPicPr>
-        <p:blipFill rotWithShape="1">
-          <a:blip r:embed="rId2">
-            <a:extLst>
-              <a:ext uri="{28A0092B-C50C-407E-A947-70E740481C1C}">
-                <a14:useLocalDpi xmlns:a14="http://schemas.microsoft.com/office/drawing/2010/main" val="0"/>
-              </a:ext>
-            </a:extLst>
-          </a:blip>
-          <a:srcRect l="17750"/>
-          <a:stretch/>
-        </p:blipFill>
-        <p:spPr bwMode="auto">
-          <a:xfrm>
-            <a:off x="2164080" y="0"/>
-            <a:ext cx="10027920" cy="6858000"/>
-          </a:xfrm>
-          <a:prstGeom prst="rect">
-            <a:avLst/>
-          </a:prstGeom>
-          <a:noFill/>
-          <a:ln>
-            <a:solidFill>
-              <a:schemeClr val="tx1"/>
-            </a:solidFill>
-          </a:ln>
-          <a:extLst>
-            <a:ext uri="{909E8E84-426E-40DD-AFC4-6F175D3DCCD1}">
-              <a14:hiddenFill xmlns:a14="http://schemas.microsoft.com/office/drawing/2010/main">
-                <a:solidFill>
-                  <a:srgbClr val="FFFFFF"/>
-                </a:solidFill>
-              </a14:hiddenFill>
-            </a:ext>
-          </a:extLst>
-        </p:spPr>
-      </p:pic>
-      <p:cxnSp>
-        <p:nvCxnSpPr>
-          <p:cNvPr id="15" name="ตัวเชื่อมต่อตรง 14">
-            <a:extLst>
-              <a:ext uri="{FF2B5EF4-FFF2-40B4-BE49-F238E27FC236}">
-                <a16:creationId xmlns:a16="http://schemas.microsoft.com/office/drawing/2014/main" id="{C8FECEAE-5585-4664-8924-BFEDE67DC4F4}"/>
-              </a:ext>
-            </a:extLst>
-          </p:cNvPr>
-          <p:cNvCxnSpPr/>
-          <p:nvPr/>
-        </p:nvCxnSpPr>
-        <p:spPr>
-          <a:xfrm>
-            <a:off x="2142565" y="0"/>
-            <a:ext cx="0" cy="6858000"/>
-          </a:xfrm>
-          <a:prstGeom prst="line">
-            <a:avLst/>
-          </a:prstGeom>
-          <a:ln w="28575">
-            <a:solidFill>
-              <a:schemeClr val="tx2">
-                <a:lumMod val="40000"/>
-                <a:lumOff val="60000"/>
-              </a:schemeClr>
-            </a:solidFill>
-          </a:ln>
-        </p:spPr>
-        <p:style>
-          <a:lnRef idx="1">
-            <a:schemeClr val="accent1"/>
-          </a:lnRef>
-          <a:fillRef idx="0">
-            <a:schemeClr val="accent1"/>
-          </a:fillRef>
-          <a:effectRef idx="0">
-            <a:schemeClr val="accent1"/>
-          </a:effectRef>
-          <a:fontRef idx="minor">
-            <a:schemeClr val="tx1"/>
-          </a:fontRef>
-        </p:style>
-      </p:cxnSp>
-      <p:sp>
-        <p:nvSpPr>
-          <p:cNvPr id="16" name="สี่เหลี่ยมผืนผ้า 15">
-            <a:extLst>
-              <a:ext uri="{FF2B5EF4-FFF2-40B4-BE49-F238E27FC236}">
-                <a16:creationId xmlns:a16="http://schemas.microsoft.com/office/drawing/2014/main" id="{C07F4C03-65E7-4823-B1C1-DA75134DFEAE}"/>
-              </a:ext>
-            </a:extLst>
-          </p:cNvPr>
-          <p:cNvSpPr/>
-          <p:nvPr/>
-        </p:nvSpPr>
-        <p:spPr>
-          <a:xfrm>
-            <a:off x="1275526" y="0"/>
-            <a:ext cx="855534" cy="350520"/>
-          </a:xfrm>
-          <a:prstGeom prst="rect">
-            <a:avLst/>
-          </a:prstGeom>
-          <a:solidFill>
-            <a:schemeClr val="bg1"/>
-          </a:solidFill>
-          <a:ln>
-            <a:noFill/>
-          </a:ln>
-        </p:spPr>
-        <p:style>
-          <a:lnRef idx="2">
-            <a:schemeClr val="accent1">
-              <a:shade val="50000"/>
-            </a:schemeClr>
-          </a:lnRef>
-          <a:fillRef idx="1">
-            <a:schemeClr val="accent1"/>
-          </a:fillRef>
-          <a:effectRef idx="0">
-            <a:schemeClr val="accent1"/>
-          </a:effectRef>
-          <a:fontRef idx="minor">
-            <a:schemeClr val="lt1"/>
-          </a:fontRef>
-        </p:style>
-        <p:txBody>
-          <a:bodyPr rtlCol="0" anchor="ctr"/>
-          <a:lstStyle/>
-          <a:p>
-            <a:pPr algn="ctr"/>
-            <a:r>
-              <a:rPr lang="en-US" sz="1200" dirty="0">
-                <a:solidFill>
-                  <a:schemeClr val="tx1"/>
-                </a:solidFill>
-              </a:rPr>
-              <a:t>Irrigation</a:t>
-            </a:r>
-            <a:endParaRPr lang="th-TH" sz="1400" dirty="0">
-              <a:solidFill>
-                <a:schemeClr val="tx1"/>
-              </a:solidFill>
-            </a:endParaRPr>
-          </a:p>
-        </p:txBody>
-      </p:sp>
-      <p:sp>
-        <p:nvSpPr>
-          <p:cNvPr id="17" name="สี่เหลี่ยมผืนผ้า 16">
-            <a:extLst>
-              <a:ext uri="{FF2B5EF4-FFF2-40B4-BE49-F238E27FC236}">
-                <a16:creationId xmlns:a16="http://schemas.microsoft.com/office/drawing/2014/main" id="{18F2D985-DC4D-4CD6-9218-C734461B72FC}"/>
-              </a:ext>
-            </a:extLst>
-          </p:cNvPr>
-          <p:cNvSpPr/>
-          <p:nvPr/>
-        </p:nvSpPr>
-        <p:spPr>
-          <a:xfrm>
-            <a:off x="1280008" y="350520"/>
-            <a:ext cx="855534" cy="350520"/>
-          </a:xfrm>
-          <a:prstGeom prst="rect">
-            <a:avLst/>
-          </a:prstGeom>
-          <a:solidFill>
-            <a:schemeClr val="bg1"/>
-          </a:solidFill>
-          <a:ln>
-            <a:noFill/>
-          </a:ln>
-        </p:spPr>
-        <p:style>
-          <a:lnRef idx="2">
-            <a:schemeClr val="accent1">
-              <a:shade val="50000"/>
-            </a:schemeClr>
-          </a:lnRef>
-          <a:fillRef idx="1">
-            <a:schemeClr val="accent1"/>
-          </a:fillRef>
-          <a:effectRef idx="0">
-            <a:schemeClr val="accent1"/>
-          </a:effectRef>
-          <a:fontRef idx="minor">
-            <a:schemeClr val="lt1"/>
-          </a:fontRef>
-        </p:style>
-        <p:txBody>
-          <a:bodyPr rtlCol="0" anchor="ctr"/>
-          <a:lstStyle/>
-          <a:p>
-            <a:pPr algn="ctr"/>
-            <a:r>
-              <a:rPr lang="en-US" sz="1200" dirty="0">
-                <a:solidFill>
-                  <a:schemeClr val="bg1">
-                    <a:lumMod val="75000"/>
-                  </a:schemeClr>
-                </a:solidFill>
-              </a:rPr>
-              <a:t>Weather</a:t>
-            </a:r>
-            <a:endParaRPr lang="th-TH" sz="1400" dirty="0">
-              <a:solidFill>
-                <a:schemeClr val="bg1">
-                  <a:lumMod val="75000"/>
-                </a:schemeClr>
-              </a:solidFill>
-            </a:endParaRPr>
-          </a:p>
-        </p:txBody>
-      </p:sp>
-      <p:sp>
-        <p:nvSpPr>
-          <p:cNvPr id="18" name="สี่เหลี่ยมผืนผ้า 17">
-            <a:extLst>
-              <a:ext uri="{FF2B5EF4-FFF2-40B4-BE49-F238E27FC236}">
-                <a16:creationId xmlns:a16="http://schemas.microsoft.com/office/drawing/2014/main" id="{78E218D4-42AC-4146-BD79-D8B1B97D9AB0}"/>
-              </a:ext>
-            </a:extLst>
-          </p:cNvPr>
-          <p:cNvSpPr/>
-          <p:nvPr/>
-        </p:nvSpPr>
-        <p:spPr>
-          <a:xfrm>
-            <a:off x="1280008" y="701040"/>
-            <a:ext cx="855534" cy="350520"/>
-          </a:xfrm>
-          <a:prstGeom prst="rect">
-            <a:avLst/>
-          </a:prstGeom>
-          <a:solidFill>
-            <a:srgbClr val="00B0F0"/>
-          </a:solidFill>
-          <a:ln>
-            <a:noFill/>
-          </a:ln>
-        </p:spPr>
-        <p:style>
-          <a:lnRef idx="2">
-            <a:schemeClr val="accent1">
-              <a:shade val="50000"/>
-            </a:schemeClr>
-          </a:lnRef>
-          <a:fillRef idx="1">
-            <a:schemeClr val="accent1"/>
-          </a:fillRef>
-          <a:effectRef idx="0">
-            <a:schemeClr val="accent1"/>
-          </a:effectRef>
-          <a:fontRef idx="minor">
-            <a:schemeClr val="lt1"/>
-          </a:fontRef>
-        </p:style>
-        <p:txBody>
-          <a:bodyPr rtlCol="0" anchor="ctr"/>
-          <a:lstStyle/>
-          <a:p>
-            <a:pPr algn="ctr"/>
-            <a:r>
-              <a:rPr lang="en-US" sz="1200" dirty="0">
-                <a:ln w="0"/>
-                <a:solidFill>
-                  <a:schemeClr val="tx1"/>
-                </a:solidFill>
-                <a:effectLst>
-                  <a:outerShdw blurRad="38100" dist="19050" dir="2700000" algn="tl" rotWithShape="0">
-                    <a:schemeClr val="dk1">
-                      <a:alpha val="40000"/>
-                    </a:schemeClr>
-                  </a:outerShdw>
-                </a:effectLst>
-              </a:rPr>
-              <a:t>Lysimeter</a:t>
-            </a:r>
-            <a:endParaRPr lang="th-TH" sz="1200" dirty="0">
-              <a:ln w="0"/>
-              <a:solidFill>
-                <a:schemeClr val="tx1"/>
-              </a:solidFill>
-              <a:effectLst>
-                <a:outerShdw blurRad="38100" dist="19050" dir="2700000" algn="tl" rotWithShape="0">
-                  <a:schemeClr val="dk1">
-                    <a:alpha val="40000"/>
-                  </a:schemeClr>
-                </a:outerShdw>
-              </a:effectLst>
-            </a:endParaRPr>
-          </a:p>
-        </p:txBody>
-      </p:sp>
-      <p:pic>
-        <p:nvPicPr>
-          <p:cNvPr id="19" name="รูปภาพ 18">
-            <a:extLst>
-              <a:ext uri="{FF2B5EF4-FFF2-40B4-BE49-F238E27FC236}">
-                <a16:creationId xmlns:a16="http://schemas.microsoft.com/office/drawing/2014/main" id="{1795F767-7F8B-4FDF-A2BD-DBBFC37D9D57}"/>
-              </a:ext>
-            </a:extLst>
-          </p:cNvPr>
-          <p:cNvPicPr>
-            <a:picLocks noChangeAspect="1"/>
-          </p:cNvPicPr>
-          <p:nvPr/>
-        </p:nvPicPr>
-        <p:blipFill rotWithShape="1">
-          <a:blip r:embed="rId3"/>
-          <a:srcRect r="89559"/>
-          <a:stretch/>
-        </p:blipFill>
-        <p:spPr>
-          <a:xfrm>
-            <a:off x="0" y="0"/>
-            <a:ext cx="1330960" cy="6858000"/>
-          </a:xfrm>
-          <a:prstGeom prst="rect">
-            <a:avLst/>
-          </a:prstGeom>
-        </p:spPr>
-      </p:pic>
-      <p:sp>
-        <p:nvSpPr>
-          <p:cNvPr id="9" name="กล่องข้อความ 9">
-            <a:extLst>
-              <a:ext uri="{FF2B5EF4-FFF2-40B4-BE49-F238E27FC236}">
-                <a16:creationId xmlns:a16="http://schemas.microsoft.com/office/drawing/2014/main" id="{C801EF94-864C-42A8-9EEB-5000DD91A2D9}"/>
-              </a:ext>
-            </a:extLst>
-          </p:cNvPr>
-          <p:cNvSpPr txBox="1"/>
-          <p:nvPr/>
-        </p:nvSpPr>
-        <p:spPr>
-          <a:xfrm>
-            <a:off x="0" y="3915233"/>
-            <a:ext cx="4731328" cy="400110"/>
-          </a:xfrm>
-          <a:prstGeom prst="rect">
-            <a:avLst/>
-          </a:prstGeom>
-          <a:noFill/>
-          <a:ln>
-            <a:noFill/>
-          </a:ln>
-        </p:spPr>
-        <p:txBody>
-          <a:bodyPr wrap="square" rtlCol="0">
-            <a:spAutoFit/>
-          </a:bodyPr>
-          <a:lstStyle/>
-          <a:p>
-            <a:r>
-              <a:rPr lang="en-US" sz="2000" dirty="0">
-                <a:solidFill>
-                  <a:srgbClr val="FF0000"/>
-                </a:solidFill>
-              </a:rPr>
-              <a:t>HEADER : Lysimeter</a:t>
-            </a:r>
-          </a:p>
-        </p:txBody>
-      </p:sp>
-      <p:graphicFrame>
-        <p:nvGraphicFramePr>
-          <p:cNvPr id="11" name="Table 2">
-            <a:extLst>
-              <a:ext uri="{FF2B5EF4-FFF2-40B4-BE49-F238E27FC236}">
-                <a16:creationId xmlns:a16="http://schemas.microsoft.com/office/drawing/2014/main" id="{8DC7F30B-62ED-4395-9B0E-A4620DE88527}"/>
-              </a:ext>
-            </a:extLst>
-          </p:cNvPr>
-          <p:cNvGraphicFramePr>
-            <a:graphicFrameLocks noGrp="1"/>
-          </p:cNvGraphicFramePr>
-          <p:nvPr/>
-        </p:nvGraphicFramePr>
-        <p:xfrm>
-          <a:off x="109753" y="4442945"/>
-          <a:ext cx="14370364" cy="370840"/>
-        </p:xfrm>
-        <a:graphic>
-          <a:graphicData uri="http://schemas.openxmlformats.org/drawingml/2006/table">
-            <a:tbl>
-              <a:tblPr firstRow="1" bandRow="1">
-                <a:tableStyleId>{5C22544A-7EE6-4342-B048-85BDC9FD1C3A}</a:tableStyleId>
-              </a:tblPr>
-              <a:tblGrid>
-                <a:gridCol w="687224">
-                  <a:extLst>
-                    <a:ext uri="{9D8B030D-6E8A-4147-A177-3AD203B41FA5}">
-                      <a16:colId xmlns:a16="http://schemas.microsoft.com/office/drawing/2014/main" val="274091452"/>
-                    </a:ext>
-                  </a:extLst>
-                </a:gridCol>
-                <a:gridCol w="813718">
-                  <a:extLst>
-                    <a:ext uri="{9D8B030D-6E8A-4147-A177-3AD203B41FA5}">
-                      <a16:colId xmlns:a16="http://schemas.microsoft.com/office/drawing/2014/main" val="2120765457"/>
-                    </a:ext>
-                  </a:extLst>
-                </a:gridCol>
-                <a:gridCol w="813718">
-                  <a:extLst>
-                    <a:ext uri="{9D8B030D-6E8A-4147-A177-3AD203B41FA5}">
-                      <a16:colId xmlns:a16="http://schemas.microsoft.com/office/drawing/2014/main" val="3799856074"/>
-                    </a:ext>
-                  </a:extLst>
-                </a:gridCol>
-                <a:gridCol w="813718">
-                  <a:extLst>
-                    <a:ext uri="{9D8B030D-6E8A-4147-A177-3AD203B41FA5}">
-                      <a16:colId xmlns:a16="http://schemas.microsoft.com/office/drawing/2014/main" val="1175590461"/>
-                    </a:ext>
-                  </a:extLst>
-                </a:gridCol>
-                <a:gridCol w="802102">
-                  <a:extLst>
-                    <a:ext uri="{9D8B030D-6E8A-4147-A177-3AD203B41FA5}">
-                      <a16:colId xmlns:a16="http://schemas.microsoft.com/office/drawing/2014/main" val="20303640"/>
-                    </a:ext>
-                  </a:extLst>
-                </a:gridCol>
-                <a:gridCol w="832432">
-                  <a:extLst>
-                    <a:ext uri="{9D8B030D-6E8A-4147-A177-3AD203B41FA5}">
-                      <a16:colId xmlns:a16="http://schemas.microsoft.com/office/drawing/2014/main" val="1778278904"/>
-                    </a:ext>
-                  </a:extLst>
-                </a:gridCol>
-                <a:gridCol w="832432">
-                  <a:extLst>
-                    <a:ext uri="{9D8B030D-6E8A-4147-A177-3AD203B41FA5}">
-                      <a16:colId xmlns:a16="http://schemas.microsoft.com/office/drawing/2014/main" val="3340717806"/>
-                    </a:ext>
-                  </a:extLst>
-                </a:gridCol>
-                <a:gridCol w="832432">
-                  <a:extLst>
-                    <a:ext uri="{9D8B030D-6E8A-4147-A177-3AD203B41FA5}">
-                      <a16:colId xmlns:a16="http://schemas.microsoft.com/office/drawing/2014/main" val="19805540"/>
-                    </a:ext>
-                  </a:extLst>
-                </a:gridCol>
-                <a:gridCol w="832432">
-                  <a:extLst>
-                    <a:ext uri="{9D8B030D-6E8A-4147-A177-3AD203B41FA5}">
-                      <a16:colId xmlns:a16="http://schemas.microsoft.com/office/drawing/2014/main" val="1808746165"/>
-                    </a:ext>
-                  </a:extLst>
-                </a:gridCol>
-                <a:gridCol w="832432">
-                  <a:extLst>
-                    <a:ext uri="{9D8B030D-6E8A-4147-A177-3AD203B41FA5}">
-                      <a16:colId xmlns:a16="http://schemas.microsoft.com/office/drawing/2014/main" val="2971934486"/>
-                    </a:ext>
-                  </a:extLst>
-                </a:gridCol>
-                <a:gridCol w="913730">
-                  <a:extLst>
-                    <a:ext uri="{9D8B030D-6E8A-4147-A177-3AD203B41FA5}">
-                      <a16:colId xmlns:a16="http://schemas.microsoft.com/office/drawing/2014/main" val="3396524758"/>
-                    </a:ext>
-                  </a:extLst>
-                </a:gridCol>
-                <a:gridCol w="913730">
-                  <a:extLst>
-                    <a:ext uri="{9D8B030D-6E8A-4147-A177-3AD203B41FA5}">
-                      <a16:colId xmlns:a16="http://schemas.microsoft.com/office/drawing/2014/main" val="1501057620"/>
-                    </a:ext>
-                  </a:extLst>
-                </a:gridCol>
-                <a:gridCol w="913730">
-                  <a:extLst>
-                    <a:ext uri="{9D8B030D-6E8A-4147-A177-3AD203B41FA5}">
-                      <a16:colId xmlns:a16="http://schemas.microsoft.com/office/drawing/2014/main" val="2443106077"/>
-                    </a:ext>
-                  </a:extLst>
-                </a:gridCol>
-                <a:gridCol w="913730">
-                  <a:extLst>
-                    <a:ext uri="{9D8B030D-6E8A-4147-A177-3AD203B41FA5}">
-                      <a16:colId xmlns:a16="http://schemas.microsoft.com/office/drawing/2014/main" val="3269512156"/>
-                    </a:ext>
-                  </a:extLst>
-                </a:gridCol>
-                <a:gridCol w="874268">
-                  <a:extLst>
-                    <a:ext uri="{9D8B030D-6E8A-4147-A177-3AD203B41FA5}">
-                      <a16:colId xmlns:a16="http://schemas.microsoft.com/office/drawing/2014/main" val="965637348"/>
-                    </a:ext>
-                  </a:extLst>
-                </a:gridCol>
-                <a:gridCol w="874268">
-                  <a:extLst>
-                    <a:ext uri="{9D8B030D-6E8A-4147-A177-3AD203B41FA5}">
-                      <a16:colId xmlns:a16="http://schemas.microsoft.com/office/drawing/2014/main" val="2981958106"/>
-                    </a:ext>
-                  </a:extLst>
-                </a:gridCol>
-                <a:gridCol w="874268">
-                  <a:extLst>
-                    <a:ext uri="{9D8B030D-6E8A-4147-A177-3AD203B41FA5}">
-                      <a16:colId xmlns:a16="http://schemas.microsoft.com/office/drawing/2014/main" val="3065469031"/>
-                    </a:ext>
-                  </a:extLst>
-                </a:gridCol>
-              </a:tblGrid>
-              <a:tr h="370840">
-                <a:tc>
-                  <a:txBody>
-                    <a:bodyPr/>
-                    <a:lstStyle/>
-                    <a:p>
-                      <a:r>
-                        <a:rPr lang="en-US" sz="1200" dirty="0"/>
-                        <a:t>D/M/Y</a:t>
-                      </a:r>
-                      <a:endParaRPr lang="th-TH" sz="1200" dirty="0"/>
-                    </a:p>
-                  </a:txBody>
-                  <a:tcPr anchor="ctr">
-                    <a:solidFill>
-                      <a:srgbClr val="04AA6D"/>
-                    </a:solidFill>
-                  </a:tcPr>
-                </a:tc>
-                <a:tc>
-                  <a:txBody>
-                    <a:bodyPr/>
-                    <a:lstStyle/>
-                    <a:p>
-                      <a:r>
-                        <a:rPr lang="en-US" sz="1200" dirty="0"/>
-                        <a:t>Lysim_Z1</a:t>
-                      </a:r>
-                      <a:endParaRPr lang="th-TH" sz="1200" dirty="0"/>
-                    </a:p>
-                  </a:txBody>
-                  <a:tcPr anchor="ctr">
-                    <a:solidFill>
-                      <a:srgbClr val="04AA6D"/>
-                    </a:solidFill>
-                  </a:tcPr>
-                </a:tc>
-                <a:tc>
-                  <a:txBody>
-                    <a:bodyPr/>
-                    <a:lstStyle/>
-                    <a:p>
-                      <a:pPr marL="0" marR="0" lvl="0" indent="0" algn="l" defTabSz="914400" rtl="0" eaLnBrk="1" fontAlgn="auto" latinLnBrk="0" hangingPunct="1">
-                        <a:lnSpc>
-                          <a:spcPct val="100000"/>
-                        </a:lnSpc>
-                        <a:spcBef>
-                          <a:spcPts val="0"/>
-                        </a:spcBef>
-                        <a:spcAft>
-                          <a:spcPts val="0"/>
-                        </a:spcAft>
-                        <a:buClrTx/>
-                        <a:buSzTx/>
-                        <a:buFontTx/>
-                        <a:buNone/>
-                        <a:tabLst/>
-                        <a:defRPr/>
-                      </a:pPr>
-                      <a:r>
-                        <a:rPr kumimoji="0" lang="en-US" sz="1200" b="1" i="0" u="none" strike="noStrike" kern="1200" cap="none" spc="0" normalizeH="0" baseline="0" noProof="0" dirty="0">
-                          <a:ln>
-                            <a:noFill/>
-                          </a:ln>
-                          <a:solidFill>
-                            <a:prstClr val="white"/>
-                          </a:solidFill>
-                          <a:effectLst/>
-                          <a:uLnTx/>
-                          <a:uFillTx/>
-                          <a:latin typeface="Calibri" panose="020F0502020204030204"/>
-                          <a:ea typeface="+mn-ea"/>
-                          <a:cs typeface="+mn-cs"/>
-                        </a:rPr>
-                        <a:t>Lysim_Z2</a:t>
-                      </a:r>
-                      <a:endParaRPr kumimoji="0" lang="th-TH" sz="1200" b="1" i="0" u="none" strike="noStrike" kern="1200" cap="none" spc="0" normalizeH="0" baseline="0" noProof="0" dirty="0">
-                        <a:ln>
-                          <a:noFill/>
-                        </a:ln>
-                        <a:solidFill>
-                          <a:prstClr val="white"/>
-                        </a:solidFill>
-                        <a:effectLst/>
-                        <a:uLnTx/>
-                        <a:uFillTx/>
-                        <a:latin typeface="Calibri" panose="020F0502020204030204"/>
-                        <a:ea typeface="+mn-ea"/>
-                        <a:cs typeface="Cordia New" panose="020B0304020202020204" pitchFamily="34" charset="-34"/>
-                      </a:endParaRPr>
-                    </a:p>
-                  </a:txBody>
-                  <a:tcPr anchor="ctr">
-                    <a:solidFill>
-                      <a:srgbClr val="04AA6D"/>
-                    </a:solidFill>
-                  </a:tcPr>
-                </a:tc>
-                <a:tc>
-                  <a:txBody>
-                    <a:bodyPr/>
-                    <a:lstStyle/>
-                    <a:p>
-                      <a:pPr marL="0" marR="0" lvl="0" indent="0" algn="l" defTabSz="914400" rtl="0" eaLnBrk="1" fontAlgn="auto" latinLnBrk="0" hangingPunct="1">
-                        <a:lnSpc>
-                          <a:spcPct val="100000"/>
-                        </a:lnSpc>
-                        <a:spcBef>
-                          <a:spcPts val="0"/>
-                        </a:spcBef>
-                        <a:spcAft>
-                          <a:spcPts val="0"/>
-                        </a:spcAft>
-                        <a:buClrTx/>
-                        <a:buSzTx/>
-                        <a:buFontTx/>
-                        <a:buNone/>
-                        <a:tabLst/>
-                        <a:defRPr/>
-                      </a:pPr>
-                      <a:r>
-                        <a:rPr kumimoji="0" lang="en-US" sz="1200" b="1" i="0" u="none" strike="noStrike" kern="1200" cap="none" spc="0" normalizeH="0" baseline="0" noProof="0" dirty="0">
-                          <a:ln>
-                            <a:noFill/>
-                          </a:ln>
-                          <a:solidFill>
-                            <a:prstClr val="white"/>
-                          </a:solidFill>
-                          <a:effectLst/>
-                          <a:uLnTx/>
-                          <a:uFillTx/>
-                          <a:latin typeface="Calibri" panose="020F0502020204030204"/>
-                          <a:ea typeface="+mn-ea"/>
-                          <a:cs typeface="+mn-cs"/>
-                        </a:rPr>
-                        <a:t>Lysim_Z3</a:t>
-                      </a:r>
-                      <a:endParaRPr kumimoji="0" lang="th-TH" sz="1200" b="1" i="0" u="none" strike="noStrike" kern="1200" cap="none" spc="0" normalizeH="0" baseline="0" noProof="0" dirty="0">
-                        <a:ln>
-                          <a:noFill/>
-                        </a:ln>
-                        <a:solidFill>
-                          <a:prstClr val="white"/>
-                        </a:solidFill>
-                        <a:effectLst/>
-                        <a:uLnTx/>
-                        <a:uFillTx/>
-                        <a:latin typeface="Calibri" panose="020F0502020204030204"/>
-                        <a:ea typeface="+mn-ea"/>
-                        <a:cs typeface="Cordia New" panose="020B0304020202020204" pitchFamily="34" charset="-34"/>
-                      </a:endParaRPr>
-                    </a:p>
-                  </a:txBody>
-                  <a:tcPr anchor="ctr">
-                    <a:solidFill>
-                      <a:srgbClr val="04AA6D"/>
-                    </a:solidFill>
-                  </a:tcPr>
-                </a:tc>
-                <a:tc>
-                  <a:txBody>
-                    <a:bodyPr/>
-                    <a:lstStyle/>
-                    <a:p>
-                      <a:pPr marL="0" marR="0" lvl="0" indent="0" algn="l" defTabSz="914400" rtl="0" eaLnBrk="1" fontAlgn="auto" latinLnBrk="0" hangingPunct="1">
-                        <a:lnSpc>
-                          <a:spcPct val="100000"/>
-                        </a:lnSpc>
-                        <a:spcBef>
-                          <a:spcPts val="0"/>
-                        </a:spcBef>
-                        <a:spcAft>
-                          <a:spcPts val="0"/>
-                        </a:spcAft>
-                        <a:buClrTx/>
-                        <a:buSzTx/>
-                        <a:buFontTx/>
-                        <a:buNone/>
-                        <a:tabLst/>
-                        <a:defRPr/>
-                      </a:pPr>
-                      <a:r>
-                        <a:rPr kumimoji="0" lang="en-US" sz="1200" b="1" i="0" u="none" strike="noStrike" kern="1200" cap="none" spc="0" normalizeH="0" baseline="0" noProof="0" dirty="0">
-                          <a:ln>
-                            <a:noFill/>
-                          </a:ln>
-                          <a:solidFill>
-                            <a:prstClr val="white"/>
-                          </a:solidFill>
-                          <a:effectLst/>
-                          <a:uLnTx/>
-                          <a:uFillTx/>
-                          <a:latin typeface="Calibri" panose="020F0502020204030204"/>
-                          <a:ea typeface="+mn-ea"/>
-                          <a:cs typeface="+mn-cs"/>
-                        </a:rPr>
-                        <a:t>Lysim_Z4</a:t>
-                      </a:r>
-                      <a:endParaRPr kumimoji="0" lang="th-TH" sz="1200" b="1" i="0" u="none" strike="noStrike" kern="1200" cap="none" spc="0" normalizeH="0" baseline="0" noProof="0" dirty="0">
-                        <a:ln>
-                          <a:noFill/>
-                        </a:ln>
-                        <a:solidFill>
-                          <a:prstClr val="white"/>
-                        </a:solidFill>
-                        <a:effectLst/>
-                        <a:uLnTx/>
-                        <a:uFillTx/>
-                        <a:latin typeface="Calibri" panose="020F0502020204030204"/>
-                        <a:ea typeface="+mn-ea"/>
-                        <a:cs typeface="Cordia New" panose="020B0304020202020204" pitchFamily="34" charset="-34"/>
-                      </a:endParaRPr>
-                    </a:p>
-                  </a:txBody>
-                  <a:tcPr anchor="ctr">
-                    <a:solidFill>
-                      <a:srgbClr val="04AA6D"/>
-                    </a:solidFill>
-                  </a:tcPr>
-                </a:tc>
-                <a:tc>
-                  <a:txBody>
-                    <a:bodyPr/>
-                    <a:lstStyle/>
-                    <a:p>
-                      <a:pPr marL="0" marR="0" lvl="0" indent="0" algn="l" defTabSz="914400" rtl="0" eaLnBrk="1" fontAlgn="auto" latinLnBrk="0" hangingPunct="1">
-                        <a:lnSpc>
-                          <a:spcPct val="100000"/>
-                        </a:lnSpc>
-                        <a:spcBef>
-                          <a:spcPts val="0"/>
-                        </a:spcBef>
-                        <a:spcAft>
-                          <a:spcPts val="0"/>
-                        </a:spcAft>
-                        <a:buClrTx/>
-                        <a:buSzTx/>
-                        <a:buFontTx/>
-                        <a:buNone/>
-                        <a:tabLst/>
-                        <a:defRPr/>
-                      </a:pPr>
-                      <a:r>
-                        <a:rPr kumimoji="0" lang="en-US" sz="1200" b="1" i="0" u="none" strike="noStrike" kern="1200" cap="none" spc="0" normalizeH="0" baseline="0" noProof="0" dirty="0">
-                          <a:ln>
-                            <a:noFill/>
-                          </a:ln>
-                          <a:solidFill>
-                            <a:prstClr val="white"/>
-                          </a:solidFill>
-                          <a:effectLst/>
-                          <a:uLnTx/>
-                          <a:uFillTx/>
-                          <a:latin typeface="Calibri" panose="020F0502020204030204"/>
-                          <a:ea typeface="+mn-ea"/>
-                          <a:cs typeface="+mn-cs"/>
-                        </a:rPr>
-                        <a:t>Lysim_Z5</a:t>
-                      </a:r>
-                      <a:endParaRPr kumimoji="0" lang="th-TH" sz="1200" b="1" i="0" u="none" strike="noStrike" kern="1200" cap="none" spc="0" normalizeH="0" baseline="0" noProof="0" dirty="0">
-                        <a:ln>
-                          <a:noFill/>
-                        </a:ln>
-                        <a:solidFill>
-                          <a:prstClr val="white"/>
-                        </a:solidFill>
-                        <a:effectLst/>
-                        <a:uLnTx/>
-                        <a:uFillTx/>
-                        <a:latin typeface="Calibri" panose="020F0502020204030204"/>
-                        <a:ea typeface="+mn-ea"/>
-                        <a:cs typeface="Cordia New" panose="020B0304020202020204" pitchFamily="34" charset="-34"/>
-                      </a:endParaRPr>
-                    </a:p>
-                  </a:txBody>
-                  <a:tcPr anchor="ctr">
-                    <a:solidFill>
-                      <a:srgbClr val="04AA6D"/>
-                    </a:solidFill>
-                  </a:tcPr>
-                </a:tc>
-                <a:tc>
-                  <a:txBody>
-                    <a:bodyPr/>
-                    <a:lstStyle/>
-                    <a:p>
-                      <a:pPr marL="0" marR="0" lvl="0" indent="0" algn="l" defTabSz="914400" rtl="0" eaLnBrk="1" fontAlgn="auto" latinLnBrk="0" hangingPunct="1">
-                        <a:lnSpc>
-                          <a:spcPct val="100000"/>
-                        </a:lnSpc>
-                        <a:spcBef>
-                          <a:spcPts val="0"/>
-                        </a:spcBef>
-                        <a:spcAft>
-                          <a:spcPts val="0"/>
-                        </a:spcAft>
-                        <a:buClrTx/>
-                        <a:buSzTx/>
-                        <a:buFontTx/>
-                        <a:buNone/>
-                        <a:tabLst/>
-                        <a:defRPr/>
-                      </a:pPr>
-                      <a:r>
-                        <a:rPr kumimoji="0" lang="en-US" sz="1200" b="1" i="0" u="none" strike="noStrike" kern="1200" cap="none" spc="0" normalizeH="0" baseline="0" noProof="0" dirty="0">
-                          <a:ln>
-                            <a:noFill/>
-                          </a:ln>
-                          <a:solidFill>
-                            <a:prstClr val="white"/>
-                          </a:solidFill>
-                          <a:effectLst/>
-                          <a:uLnTx/>
-                          <a:uFillTx/>
-                          <a:latin typeface="Calibri" panose="020F0502020204030204"/>
-                          <a:ea typeface="+mn-ea"/>
-                          <a:cs typeface="+mn-cs"/>
-                        </a:rPr>
-                        <a:t>Lysim_Z6</a:t>
-                      </a:r>
-                      <a:endParaRPr kumimoji="0" lang="th-TH" sz="1200" b="1" i="0" u="none" strike="noStrike" kern="1200" cap="none" spc="0" normalizeH="0" baseline="0" noProof="0" dirty="0">
-                        <a:ln>
-                          <a:noFill/>
-                        </a:ln>
-                        <a:solidFill>
-                          <a:prstClr val="white"/>
-                        </a:solidFill>
-                        <a:effectLst/>
-                        <a:uLnTx/>
-                        <a:uFillTx/>
-                        <a:latin typeface="Calibri" panose="020F0502020204030204"/>
-                        <a:ea typeface="+mn-ea"/>
-                        <a:cs typeface="Cordia New" panose="020B0304020202020204" pitchFamily="34" charset="-34"/>
-                      </a:endParaRPr>
-                    </a:p>
-                  </a:txBody>
-                  <a:tcPr anchor="ctr">
-                    <a:solidFill>
-                      <a:srgbClr val="04AA6D"/>
-                    </a:solidFill>
-                  </a:tcPr>
-                </a:tc>
-                <a:tc>
-                  <a:txBody>
-                    <a:bodyPr/>
-                    <a:lstStyle/>
-                    <a:p>
-                      <a:pPr marL="0" marR="0" lvl="0" indent="0" algn="l" defTabSz="914400" rtl="0" eaLnBrk="1" fontAlgn="auto" latinLnBrk="0" hangingPunct="1">
-                        <a:lnSpc>
-                          <a:spcPct val="100000"/>
-                        </a:lnSpc>
-                        <a:spcBef>
-                          <a:spcPts val="0"/>
-                        </a:spcBef>
-                        <a:spcAft>
-                          <a:spcPts val="0"/>
-                        </a:spcAft>
-                        <a:buClrTx/>
-                        <a:buSzTx/>
-                        <a:buFontTx/>
-                        <a:buNone/>
-                        <a:tabLst/>
-                        <a:defRPr/>
-                      </a:pPr>
-                      <a:r>
-                        <a:rPr kumimoji="0" lang="en-US" sz="1200" b="1" i="0" u="none" strike="noStrike" kern="1200" cap="none" spc="0" normalizeH="0" baseline="0" noProof="0" dirty="0">
-                          <a:ln>
-                            <a:noFill/>
-                          </a:ln>
-                          <a:solidFill>
-                            <a:prstClr val="white"/>
-                          </a:solidFill>
-                          <a:effectLst/>
-                          <a:uLnTx/>
-                          <a:uFillTx/>
-                          <a:latin typeface="Calibri" panose="020F0502020204030204"/>
-                          <a:ea typeface="+mn-ea"/>
-                          <a:cs typeface="+mn-cs"/>
-                        </a:rPr>
-                        <a:t>Lysim_Z7</a:t>
-                      </a:r>
-                      <a:endParaRPr kumimoji="0" lang="th-TH" sz="1200" b="1" i="0" u="none" strike="noStrike" kern="1200" cap="none" spc="0" normalizeH="0" baseline="0" noProof="0" dirty="0">
-                        <a:ln>
-                          <a:noFill/>
-                        </a:ln>
-                        <a:solidFill>
-                          <a:prstClr val="white"/>
-                        </a:solidFill>
-                        <a:effectLst/>
-                        <a:uLnTx/>
-                        <a:uFillTx/>
-                        <a:latin typeface="Calibri" panose="020F0502020204030204"/>
-                        <a:ea typeface="+mn-ea"/>
-                        <a:cs typeface="Cordia New" panose="020B0304020202020204" pitchFamily="34" charset="-34"/>
-                      </a:endParaRPr>
-                    </a:p>
-                  </a:txBody>
-                  <a:tcPr anchor="ctr">
-                    <a:solidFill>
-                      <a:srgbClr val="04AA6D"/>
-                    </a:solidFill>
-                  </a:tcPr>
-                </a:tc>
-                <a:tc>
-                  <a:txBody>
-                    <a:bodyPr/>
-                    <a:lstStyle/>
-                    <a:p>
-                      <a:pPr marL="0" marR="0" lvl="0" indent="0" algn="l" defTabSz="914400" rtl="0" eaLnBrk="1" fontAlgn="auto" latinLnBrk="0" hangingPunct="1">
-                        <a:lnSpc>
-                          <a:spcPct val="100000"/>
-                        </a:lnSpc>
-                        <a:spcBef>
-                          <a:spcPts val="0"/>
-                        </a:spcBef>
-                        <a:spcAft>
-                          <a:spcPts val="0"/>
-                        </a:spcAft>
-                        <a:buClrTx/>
-                        <a:buSzTx/>
-                        <a:buFontTx/>
-                        <a:buNone/>
-                        <a:tabLst/>
-                        <a:defRPr/>
-                      </a:pPr>
-                      <a:r>
-                        <a:rPr kumimoji="0" lang="en-US" sz="1200" b="1" i="0" u="none" strike="noStrike" kern="1200" cap="none" spc="0" normalizeH="0" baseline="0" noProof="0" dirty="0">
-                          <a:ln>
-                            <a:noFill/>
-                          </a:ln>
-                          <a:solidFill>
-                            <a:prstClr val="white"/>
-                          </a:solidFill>
-                          <a:effectLst/>
-                          <a:uLnTx/>
-                          <a:uFillTx/>
-                          <a:latin typeface="Calibri" panose="020F0502020204030204"/>
-                          <a:ea typeface="+mn-ea"/>
-                          <a:cs typeface="+mn-cs"/>
-                        </a:rPr>
-                        <a:t>Lysim_Z8</a:t>
-                      </a:r>
-                      <a:endParaRPr kumimoji="0" lang="th-TH" sz="1200" b="1" i="0" u="none" strike="noStrike" kern="1200" cap="none" spc="0" normalizeH="0" baseline="0" noProof="0" dirty="0">
-                        <a:ln>
-                          <a:noFill/>
-                        </a:ln>
-                        <a:solidFill>
-                          <a:prstClr val="white"/>
-                        </a:solidFill>
-                        <a:effectLst/>
-                        <a:uLnTx/>
-                        <a:uFillTx/>
-                        <a:latin typeface="Calibri" panose="020F0502020204030204"/>
-                        <a:ea typeface="+mn-ea"/>
-                        <a:cs typeface="Cordia New" panose="020B0304020202020204" pitchFamily="34" charset="-34"/>
-                      </a:endParaRPr>
-                    </a:p>
-                  </a:txBody>
-                  <a:tcPr anchor="ctr">
-                    <a:solidFill>
-                      <a:srgbClr val="04AA6D"/>
-                    </a:solidFill>
-                  </a:tcPr>
-                </a:tc>
-                <a:tc>
-                  <a:txBody>
-                    <a:bodyPr/>
-                    <a:lstStyle/>
-                    <a:p>
-                      <a:pPr marL="0" marR="0" lvl="0" indent="0" algn="l" defTabSz="914400" rtl="0" eaLnBrk="1" fontAlgn="auto" latinLnBrk="0" hangingPunct="1">
-                        <a:lnSpc>
-                          <a:spcPct val="100000"/>
-                        </a:lnSpc>
-                        <a:spcBef>
-                          <a:spcPts val="0"/>
-                        </a:spcBef>
-                        <a:spcAft>
-                          <a:spcPts val="0"/>
-                        </a:spcAft>
-                        <a:buClrTx/>
-                        <a:buSzTx/>
-                        <a:buFontTx/>
-                        <a:buNone/>
-                        <a:tabLst/>
-                        <a:defRPr/>
-                      </a:pPr>
-                      <a:r>
-                        <a:rPr kumimoji="0" lang="en-US" sz="1200" b="1" i="0" u="none" strike="noStrike" kern="1200" cap="none" spc="0" normalizeH="0" baseline="0" noProof="0" dirty="0">
-                          <a:ln>
-                            <a:noFill/>
-                          </a:ln>
-                          <a:solidFill>
-                            <a:prstClr val="white"/>
-                          </a:solidFill>
-                          <a:effectLst/>
-                          <a:uLnTx/>
-                          <a:uFillTx/>
-                          <a:latin typeface="Calibri" panose="020F0502020204030204"/>
-                          <a:ea typeface="+mn-ea"/>
-                          <a:cs typeface="+mn-cs"/>
-                        </a:rPr>
-                        <a:t>Lysim_Z9</a:t>
-                      </a:r>
-                      <a:endParaRPr kumimoji="0" lang="th-TH" sz="1200" b="1" i="0" u="none" strike="noStrike" kern="1200" cap="none" spc="0" normalizeH="0" baseline="0" noProof="0" dirty="0">
-                        <a:ln>
-                          <a:noFill/>
-                        </a:ln>
-                        <a:solidFill>
-                          <a:prstClr val="white"/>
-                        </a:solidFill>
-                        <a:effectLst/>
-                        <a:uLnTx/>
-                        <a:uFillTx/>
-                        <a:latin typeface="Calibri" panose="020F0502020204030204"/>
-                        <a:ea typeface="+mn-ea"/>
-                        <a:cs typeface="Cordia New" panose="020B0304020202020204" pitchFamily="34" charset="-34"/>
-                      </a:endParaRPr>
-                    </a:p>
-                  </a:txBody>
-                  <a:tcPr anchor="ctr">
-                    <a:solidFill>
-                      <a:srgbClr val="04AA6D"/>
-                    </a:solidFill>
-                  </a:tcPr>
-                </a:tc>
-                <a:tc>
-                  <a:txBody>
-                    <a:bodyPr/>
-                    <a:lstStyle/>
-                    <a:p>
-                      <a:pPr marL="0" marR="0" lvl="0" indent="0" algn="l" defTabSz="914400" rtl="0" eaLnBrk="1" fontAlgn="auto" latinLnBrk="0" hangingPunct="1">
-                        <a:lnSpc>
-                          <a:spcPct val="100000"/>
-                        </a:lnSpc>
-                        <a:spcBef>
-                          <a:spcPts val="0"/>
-                        </a:spcBef>
-                        <a:spcAft>
-                          <a:spcPts val="0"/>
-                        </a:spcAft>
-                        <a:buClrTx/>
-                        <a:buSzTx/>
-                        <a:buFontTx/>
-                        <a:buNone/>
-                        <a:tabLst/>
-                        <a:defRPr/>
-                      </a:pPr>
-                      <a:r>
-                        <a:rPr kumimoji="0" lang="en-US" sz="1200" b="1" i="0" u="none" strike="noStrike" kern="1200" cap="none" spc="0" normalizeH="0" baseline="0" noProof="0" dirty="0">
-                          <a:ln>
-                            <a:noFill/>
-                          </a:ln>
-                          <a:solidFill>
-                            <a:prstClr val="white"/>
-                          </a:solidFill>
-                          <a:effectLst/>
-                          <a:uLnTx/>
-                          <a:uFillTx/>
-                          <a:latin typeface="Calibri" panose="020F0502020204030204"/>
-                          <a:ea typeface="+mn-ea"/>
-                          <a:cs typeface="+mn-cs"/>
-                        </a:rPr>
-                        <a:t>Lysim_Z10</a:t>
-                      </a:r>
-                      <a:endParaRPr kumimoji="0" lang="th-TH" sz="1200" b="1" i="0" u="none" strike="noStrike" kern="1200" cap="none" spc="0" normalizeH="0" baseline="0" noProof="0" dirty="0">
-                        <a:ln>
-                          <a:noFill/>
-                        </a:ln>
-                        <a:solidFill>
-                          <a:prstClr val="white"/>
-                        </a:solidFill>
-                        <a:effectLst/>
-                        <a:uLnTx/>
-                        <a:uFillTx/>
-                        <a:latin typeface="Calibri" panose="020F0502020204030204"/>
-                        <a:ea typeface="+mn-ea"/>
-                        <a:cs typeface="Cordia New" panose="020B0304020202020204" pitchFamily="34" charset="-34"/>
-                      </a:endParaRPr>
-                    </a:p>
-                  </a:txBody>
-                  <a:tcPr anchor="ctr">
-                    <a:solidFill>
-                      <a:srgbClr val="04AA6D"/>
-                    </a:solidFill>
-                  </a:tcPr>
-                </a:tc>
-                <a:tc>
-                  <a:txBody>
-                    <a:bodyPr/>
-                    <a:lstStyle/>
-                    <a:p>
-                      <a:pPr marL="0" marR="0" lvl="0" indent="0" algn="l" defTabSz="914400" rtl="0" eaLnBrk="1" fontAlgn="auto" latinLnBrk="0" hangingPunct="1">
-                        <a:lnSpc>
-                          <a:spcPct val="100000"/>
-                        </a:lnSpc>
-                        <a:spcBef>
-                          <a:spcPts val="0"/>
-                        </a:spcBef>
-                        <a:spcAft>
-                          <a:spcPts val="0"/>
-                        </a:spcAft>
-                        <a:buClrTx/>
-                        <a:buSzTx/>
-                        <a:buFontTx/>
-                        <a:buNone/>
-                        <a:tabLst/>
-                        <a:defRPr/>
-                      </a:pPr>
-                      <a:r>
-                        <a:rPr kumimoji="0" lang="en-US" sz="1200" b="1" i="0" u="none" strike="noStrike" kern="1200" cap="none" spc="0" normalizeH="0" baseline="0" noProof="0" dirty="0">
-                          <a:ln>
-                            <a:noFill/>
-                          </a:ln>
-                          <a:solidFill>
-                            <a:prstClr val="white"/>
-                          </a:solidFill>
-                          <a:effectLst/>
-                          <a:uLnTx/>
-                          <a:uFillTx/>
-                          <a:latin typeface="Calibri" panose="020F0502020204030204"/>
-                          <a:ea typeface="+mn-ea"/>
-                          <a:cs typeface="+mn-cs"/>
-                        </a:rPr>
-                        <a:t>Lysim_Z11</a:t>
-                      </a:r>
-                      <a:endParaRPr kumimoji="0" lang="th-TH" sz="1200" b="1" i="0" u="none" strike="noStrike" kern="1200" cap="none" spc="0" normalizeH="0" baseline="0" noProof="0" dirty="0">
-                        <a:ln>
-                          <a:noFill/>
-                        </a:ln>
-                        <a:solidFill>
-                          <a:prstClr val="white"/>
-                        </a:solidFill>
-                        <a:effectLst/>
-                        <a:uLnTx/>
-                        <a:uFillTx/>
-                        <a:latin typeface="+mn-lt"/>
-                        <a:ea typeface="+mn-ea"/>
-                        <a:cs typeface="+mn-cs"/>
-                      </a:endParaRPr>
-                    </a:p>
-                  </a:txBody>
-                  <a:tcPr anchor="ctr">
-                    <a:solidFill>
-                      <a:srgbClr val="04AA6D"/>
-                    </a:solidFill>
-                  </a:tcPr>
-                </a:tc>
-                <a:tc>
-                  <a:txBody>
-                    <a:bodyPr/>
-                    <a:lstStyle/>
-                    <a:p>
-                      <a:pPr marL="0" marR="0" lvl="0" indent="0" algn="l" defTabSz="914400" rtl="0" eaLnBrk="1" fontAlgn="auto" latinLnBrk="0" hangingPunct="1">
-                        <a:lnSpc>
-                          <a:spcPct val="100000"/>
-                        </a:lnSpc>
-                        <a:spcBef>
-                          <a:spcPts val="0"/>
-                        </a:spcBef>
-                        <a:spcAft>
-                          <a:spcPts val="0"/>
-                        </a:spcAft>
-                        <a:buClrTx/>
-                        <a:buSzTx/>
-                        <a:buFontTx/>
-                        <a:buNone/>
-                        <a:tabLst/>
-                        <a:defRPr/>
-                      </a:pPr>
-                      <a:r>
-                        <a:rPr kumimoji="0" lang="en-US" sz="1200" b="1" i="0" u="none" strike="noStrike" kern="1200" cap="none" spc="0" normalizeH="0" baseline="0" noProof="0" dirty="0">
-                          <a:ln>
-                            <a:noFill/>
-                          </a:ln>
-                          <a:solidFill>
-                            <a:prstClr val="white"/>
-                          </a:solidFill>
-                          <a:effectLst/>
-                          <a:uLnTx/>
-                          <a:uFillTx/>
-                          <a:latin typeface="Calibri" panose="020F0502020204030204"/>
-                          <a:ea typeface="+mn-ea"/>
-                          <a:cs typeface="+mn-cs"/>
-                        </a:rPr>
-                        <a:t>Lysim_Z12</a:t>
-                      </a:r>
-                      <a:endParaRPr kumimoji="0" lang="th-TH" sz="1200" b="1" i="0" u="none" strike="noStrike" kern="1200" cap="none" spc="0" normalizeH="0" baseline="0" noProof="0" dirty="0">
-                        <a:ln>
-                          <a:noFill/>
-                        </a:ln>
-                        <a:solidFill>
-                          <a:prstClr val="white"/>
-                        </a:solidFill>
-                        <a:effectLst/>
-                        <a:uLnTx/>
-                        <a:uFillTx/>
-                        <a:latin typeface="Calibri" panose="020F0502020204030204"/>
-                        <a:ea typeface="+mn-ea"/>
-                        <a:cs typeface="Cordia New" panose="020B0304020202020204" pitchFamily="34" charset="-34"/>
-                      </a:endParaRPr>
-                    </a:p>
-                  </a:txBody>
-                  <a:tcPr anchor="ctr">
-                    <a:solidFill>
-                      <a:srgbClr val="04AA6D"/>
-                    </a:solidFill>
-                  </a:tcPr>
-                </a:tc>
-                <a:tc>
-                  <a:txBody>
-                    <a:bodyPr/>
-                    <a:lstStyle/>
-                    <a:p>
-                      <a:pPr marL="0" marR="0" lvl="0" indent="0" algn="l" defTabSz="914400" rtl="0" eaLnBrk="1" fontAlgn="auto" latinLnBrk="0" hangingPunct="1">
-                        <a:lnSpc>
-                          <a:spcPct val="100000"/>
-                        </a:lnSpc>
-                        <a:spcBef>
-                          <a:spcPts val="0"/>
-                        </a:spcBef>
-                        <a:spcAft>
-                          <a:spcPts val="0"/>
-                        </a:spcAft>
-                        <a:buClrTx/>
-                        <a:buSzTx/>
-                        <a:buFontTx/>
-                        <a:buNone/>
-                        <a:tabLst/>
-                        <a:defRPr/>
-                      </a:pPr>
-                      <a:r>
-                        <a:rPr kumimoji="0" lang="en-US" sz="1200" b="1" i="0" u="none" strike="noStrike" kern="1200" cap="none" spc="0" normalizeH="0" baseline="0" noProof="0" dirty="0">
-                          <a:ln>
-                            <a:noFill/>
-                          </a:ln>
-                          <a:solidFill>
-                            <a:prstClr val="white"/>
-                          </a:solidFill>
-                          <a:effectLst/>
-                          <a:uLnTx/>
-                          <a:uFillTx/>
-                          <a:latin typeface="Calibri" panose="020F0502020204030204"/>
-                          <a:ea typeface="+mn-ea"/>
-                          <a:cs typeface="+mn-cs"/>
-                        </a:rPr>
-                        <a:t>Lysim_Z13</a:t>
-                      </a:r>
-                      <a:endParaRPr kumimoji="0" lang="th-TH" sz="1200" b="1" i="0" u="none" strike="noStrike" kern="1200" cap="none" spc="0" normalizeH="0" baseline="0" noProof="0" dirty="0">
-                        <a:ln>
-                          <a:noFill/>
-                        </a:ln>
-                        <a:solidFill>
-                          <a:prstClr val="white"/>
-                        </a:solidFill>
-                        <a:effectLst/>
-                        <a:uLnTx/>
-                        <a:uFillTx/>
-                        <a:latin typeface="Calibri" panose="020F0502020204030204"/>
-                        <a:ea typeface="+mn-ea"/>
-                        <a:cs typeface="Cordia New" panose="020B0304020202020204" pitchFamily="34" charset="-34"/>
-                      </a:endParaRPr>
-                    </a:p>
-                  </a:txBody>
-                  <a:tcPr anchor="ctr">
-                    <a:solidFill>
-                      <a:srgbClr val="04AA6D"/>
-                    </a:solidFill>
-                  </a:tcPr>
-                </a:tc>
-                <a:tc>
-                  <a:txBody>
-                    <a:bodyPr/>
-                    <a:lstStyle/>
-                    <a:p>
-                      <a:pPr marL="0" marR="0" lvl="0" indent="0" algn="l" defTabSz="914400" rtl="0" eaLnBrk="1" fontAlgn="auto" latinLnBrk="0" hangingPunct="1">
-                        <a:lnSpc>
-                          <a:spcPct val="100000"/>
-                        </a:lnSpc>
-                        <a:spcBef>
-                          <a:spcPts val="0"/>
-                        </a:spcBef>
-                        <a:spcAft>
-                          <a:spcPts val="0"/>
-                        </a:spcAft>
-                        <a:buClrTx/>
-                        <a:buSzTx/>
-                        <a:buFontTx/>
-                        <a:buNone/>
-                        <a:tabLst/>
-                        <a:defRPr/>
-                      </a:pPr>
-                      <a:r>
-                        <a:rPr kumimoji="0" lang="en-US" sz="1200" b="1" i="0" u="none" strike="noStrike" kern="1200" cap="none" spc="0" normalizeH="0" baseline="0" noProof="0" dirty="0">
-                          <a:ln>
-                            <a:noFill/>
-                          </a:ln>
-                          <a:solidFill>
-                            <a:prstClr val="white"/>
-                          </a:solidFill>
-                          <a:effectLst/>
-                          <a:uLnTx/>
-                          <a:uFillTx/>
-                          <a:latin typeface="Calibri" panose="020F0502020204030204"/>
-                          <a:ea typeface="+mn-ea"/>
-                          <a:cs typeface="+mn-cs"/>
-                        </a:rPr>
-                        <a:t>Lysim_Z14</a:t>
-                      </a:r>
-                      <a:endParaRPr kumimoji="0" lang="th-TH" sz="1200" b="1" i="0" u="none" strike="noStrike" kern="1200" cap="none" spc="0" normalizeH="0" baseline="0" noProof="0" dirty="0">
-                        <a:ln>
-                          <a:noFill/>
-                        </a:ln>
-                        <a:solidFill>
-                          <a:prstClr val="white"/>
-                        </a:solidFill>
-                        <a:effectLst/>
-                        <a:uLnTx/>
-                        <a:uFillTx/>
-                        <a:latin typeface="Calibri" panose="020F0502020204030204"/>
-                        <a:ea typeface="+mn-ea"/>
-                        <a:cs typeface="Cordia New" panose="020B0304020202020204" pitchFamily="34" charset="-34"/>
-                      </a:endParaRPr>
-                    </a:p>
-                  </a:txBody>
-                  <a:tcPr anchor="ctr">
-                    <a:solidFill>
-                      <a:srgbClr val="04AA6D"/>
-                    </a:solidFill>
-                  </a:tcPr>
-                </a:tc>
-                <a:tc>
-                  <a:txBody>
-                    <a:bodyPr/>
-                    <a:lstStyle/>
-                    <a:p>
-                      <a:pPr marL="0" marR="0" lvl="0" indent="0" algn="l" defTabSz="914400" rtl="0" eaLnBrk="1" fontAlgn="auto" latinLnBrk="0" hangingPunct="1">
-                        <a:lnSpc>
-                          <a:spcPct val="100000"/>
-                        </a:lnSpc>
-                        <a:spcBef>
-                          <a:spcPts val="0"/>
-                        </a:spcBef>
-                        <a:spcAft>
-                          <a:spcPts val="0"/>
-                        </a:spcAft>
-                        <a:buClrTx/>
-                        <a:buSzTx/>
-                        <a:buFontTx/>
-                        <a:buNone/>
-                        <a:tabLst/>
-                        <a:defRPr/>
-                      </a:pPr>
-                      <a:r>
-                        <a:rPr kumimoji="0" lang="en-US" sz="1200" b="1" i="0" u="none" strike="noStrike" kern="1200" cap="none" spc="0" normalizeH="0" baseline="0" noProof="0" dirty="0">
-                          <a:ln>
-                            <a:noFill/>
-                          </a:ln>
-                          <a:solidFill>
-                            <a:prstClr val="white"/>
-                          </a:solidFill>
-                          <a:effectLst/>
-                          <a:uLnTx/>
-                          <a:uFillTx/>
-                          <a:latin typeface="Calibri" panose="020F0502020204030204"/>
-                          <a:ea typeface="+mn-ea"/>
-                          <a:cs typeface="+mn-cs"/>
-                        </a:rPr>
-                        <a:t>Lysim_Z15</a:t>
-                      </a:r>
-                      <a:endParaRPr kumimoji="0" lang="th-TH" sz="1200" b="1" i="0" u="none" strike="noStrike" kern="1200" cap="none" spc="0" normalizeH="0" baseline="0" noProof="0" dirty="0">
-                        <a:ln>
-                          <a:noFill/>
-                        </a:ln>
-                        <a:solidFill>
-                          <a:prstClr val="white"/>
-                        </a:solidFill>
-                        <a:effectLst/>
-                        <a:uLnTx/>
-                        <a:uFillTx/>
-                        <a:latin typeface="+mn-lt"/>
-                        <a:ea typeface="+mn-ea"/>
-                        <a:cs typeface="+mn-cs"/>
-                      </a:endParaRPr>
-                    </a:p>
-                  </a:txBody>
-                  <a:tcPr anchor="ctr">
-                    <a:solidFill>
-                      <a:srgbClr val="04AA6D"/>
-                    </a:solidFill>
-                  </a:tcPr>
-                </a:tc>
-                <a:tc>
-                  <a:txBody>
-                    <a:bodyPr/>
-                    <a:lstStyle/>
-                    <a:p>
-                      <a:pPr marL="0" marR="0" lvl="0" indent="0" algn="l" defTabSz="914400" rtl="0" eaLnBrk="1" fontAlgn="auto" latinLnBrk="0" hangingPunct="1">
-                        <a:lnSpc>
-                          <a:spcPct val="100000"/>
-                        </a:lnSpc>
-                        <a:spcBef>
-                          <a:spcPts val="0"/>
-                        </a:spcBef>
-                        <a:spcAft>
-                          <a:spcPts val="0"/>
-                        </a:spcAft>
-                        <a:buClrTx/>
-                        <a:buSzTx/>
-                        <a:buFontTx/>
-                        <a:buNone/>
-                        <a:tabLst/>
-                        <a:defRPr/>
-                      </a:pPr>
-                      <a:r>
-                        <a:rPr kumimoji="0" lang="en-US" sz="1200" b="1" i="0" u="none" strike="noStrike" kern="1200" cap="none" spc="0" normalizeH="0" baseline="0" noProof="0" dirty="0">
-                          <a:ln>
-                            <a:noFill/>
-                          </a:ln>
-                          <a:solidFill>
-                            <a:prstClr val="white"/>
-                          </a:solidFill>
-                          <a:effectLst/>
-                          <a:uLnTx/>
-                          <a:uFillTx/>
-                          <a:latin typeface="Calibri" panose="020F0502020204030204"/>
-                          <a:ea typeface="+mn-ea"/>
-                          <a:cs typeface="+mn-cs"/>
-                        </a:rPr>
-                        <a:t>Lysim_Z16</a:t>
-                      </a:r>
-                      <a:endParaRPr kumimoji="0" lang="th-TH" sz="1200" b="1" i="0" u="none" strike="noStrike" kern="1200" cap="none" spc="0" normalizeH="0" baseline="0" noProof="0" dirty="0">
-                        <a:ln>
-                          <a:noFill/>
-                        </a:ln>
-                        <a:solidFill>
-                          <a:prstClr val="white"/>
-                        </a:solidFill>
-                        <a:effectLst/>
-                        <a:uLnTx/>
-                        <a:uFillTx/>
-                        <a:latin typeface="Calibri" panose="020F0502020204030204"/>
-                        <a:ea typeface="+mn-ea"/>
-                        <a:cs typeface="Cordia New" panose="020B0304020202020204" pitchFamily="34" charset="-34"/>
-                      </a:endParaRPr>
-                    </a:p>
-                  </a:txBody>
-                  <a:tcPr anchor="ctr">
-                    <a:solidFill>
-                      <a:srgbClr val="04AA6D"/>
-                    </a:solidFill>
-                  </a:tcPr>
-                </a:tc>
-                <a:extLst>
-                  <a:ext uri="{0D108BD9-81ED-4DB2-BD59-A6C34878D82A}">
-                    <a16:rowId xmlns:a16="http://schemas.microsoft.com/office/drawing/2014/main" val="3837336238"/>
-                  </a:ext>
-                </a:extLst>
-              </a:tr>
-            </a:tbl>
-          </a:graphicData>
-        </a:graphic>
-      </p:graphicFrame>
-      <p:sp>
-        <p:nvSpPr>
-          <p:cNvPr id="10" name="กล่องข้อความ 9">
-            <a:extLst>
-              <a:ext uri="{FF2B5EF4-FFF2-40B4-BE49-F238E27FC236}">
-                <a16:creationId xmlns:a16="http://schemas.microsoft.com/office/drawing/2014/main" id="{35DA22EE-A889-4751-8527-FB4B17120BCC}"/>
-              </a:ext>
-            </a:extLst>
-          </p:cNvPr>
-          <p:cNvSpPr txBox="1"/>
-          <p:nvPr/>
-        </p:nvSpPr>
-        <p:spPr>
-          <a:xfrm>
-            <a:off x="2365664" y="4941387"/>
-            <a:ext cx="4731328" cy="646331"/>
-          </a:xfrm>
-          <a:prstGeom prst="rect">
-            <a:avLst/>
-          </a:prstGeom>
-          <a:noFill/>
-          <a:ln>
-            <a:noFill/>
-          </a:ln>
-        </p:spPr>
-        <p:txBody>
-          <a:bodyPr wrap="square" rtlCol="0">
-            <a:spAutoFit/>
-          </a:bodyPr>
-          <a:lstStyle/>
-          <a:p>
-            <a:r>
-              <a:rPr lang="en-US" sz="1800" dirty="0">
-                <a:solidFill>
-                  <a:srgbClr val="FF0000"/>
-                </a:solidFill>
-              </a:rPr>
-              <a:t>UNIT</a:t>
-            </a:r>
-          </a:p>
-          <a:p>
-            <a:r>
-              <a:rPr lang="en-US" sz="1800" dirty="0" err="1">
-                <a:solidFill>
-                  <a:srgbClr val="FF0000"/>
-                </a:solidFill>
-              </a:rPr>
-              <a:t>Lysim</a:t>
-            </a:r>
-            <a:r>
-              <a:rPr lang="en-US" sz="1800" dirty="0">
-                <a:solidFill>
-                  <a:srgbClr val="FF0000"/>
-                </a:solidFill>
-              </a:rPr>
-              <a:t> : CM</a:t>
-            </a:r>
-          </a:p>
-        </p:txBody>
-      </p:sp>
-    </p:spTree>
-    <p:extLst>
-      <p:ext uri="{BB962C8B-B14F-4D97-AF65-F5344CB8AC3E}">
-        <p14:creationId xmlns:p14="http://schemas.microsoft.com/office/powerpoint/2010/main" val="3893118571"/>
-      </p:ext>
-    </p:extLst>
-  </p:cSld>
-  <p:clrMapOvr>
-    <a:masterClrMapping/>
-  </p:clrMapOvr>
-</p:sld>
-</file>
-
 <file path=ppt/theme/theme1.xml><?xml version="1.0" encoding="utf-8"?>
 <a:theme xmlns:a="http://schemas.openxmlformats.org/drawingml/2006/main" name="ธีมของ Office">
   <a:themeElements>

</xml_diff>

<commit_message>
edit table and date filter 30 day
edit table and date filter 30 day
</commit_message>
<xml_diff>
--- a/my-app1/src/Web_App.pptx
+++ b/my-app1/src/Web_App.pptx
@@ -275,7 +275,7 @@
           <a:p>
             <a:fld id="{4CA111CD-02F0-4221-AD8C-2FBDC4F2E84D}" type="datetimeFigureOut">
               <a:rPr lang="th-TH" smtClean="0"/>
-              <a:t>12/03/65</a:t>
+              <a:t>26/03/65</a:t>
             </a:fld>
             <a:endParaRPr lang="th-TH"/>
           </a:p>
@@ -473,7 +473,7 @@
           <a:p>
             <a:fld id="{4CA111CD-02F0-4221-AD8C-2FBDC4F2E84D}" type="datetimeFigureOut">
               <a:rPr lang="th-TH" smtClean="0"/>
-              <a:t>12/03/65</a:t>
+              <a:t>26/03/65</a:t>
             </a:fld>
             <a:endParaRPr lang="th-TH"/>
           </a:p>
@@ -681,7 +681,7 @@
           <a:p>
             <a:fld id="{4CA111CD-02F0-4221-AD8C-2FBDC4F2E84D}" type="datetimeFigureOut">
               <a:rPr lang="th-TH" smtClean="0"/>
-              <a:t>12/03/65</a:t>
+              <a:t>26/03/65</a:t>
             </a:fld>
             <a:endParaRPr lang="th-TH"/>
           </a:p>
@@ -879,7 +879,7 @@
           <a:p>
             <a:fld id="{4CA111CD-02F0-4221-AD8C-2FBDC4F2E84D}" type="datetimeFigureOut">
               <a:rPr lang="th-TH" smtClean="0"/>
-              <a:t>12/03/65</a:t>
+              <a:t>26/03/65</a:t>
             </a:fld>
             <a:endParaRPr lang="th-TH"/>
           </a:p>
@@ -1154,7 +1154,7 @@
           <a:p>
             <a:fld id="{4CA111CD-02F0-4221-AD8C-2FBDC4F2E84D}" type="datetimeFigureOut">
               <a:rPr lang="th-TH" smtClean="0"/>
-              <a:t>12/03/65</a:t>
+              <a:t>26/03/65</a:t>
             </a:fld>
             <a:endParaRPr lang="th-TH"/>
           </a:p>
@@ -1419,7 +1419,7 @@
           <a:p>
             <a:fld id="{4CA111CD-02F0-4221-AD8C-2FBDC4F2E84D}" type="datetimeFigureOut">
               <a:rPr lang="th-TH" smtClean="0"/>
-              <a:t>12/03/65</a:t>
+              <a:t>26/03/65</a:t>
             </a:fld>
             <a:endParaRPr lang="th-TH"/>
           </a:p>
@@ -1831,7 +1831,7 @@
           <a:p>
             <a:fld id="{4CA111CD-02F0-4221-AD8C-2FBDC4F2E84D}" type="datetimeFigureOut">
               <a:rPr lang="th-TH" smtClean="0"/>
-              <a:t>12/03/65</a:t>
+              <a:t>26/03/65</a:t>
             </a:fld>
             <a:endParaRPr lang="th-TH"/>
           </a:p>
@@ -1972,7 +1972,7 @@
           <a:p>
             <a:fld id="{4CA111CD-02F0-4221-AD8C-2FBDC4F2E84D}" type="datetimeFigureOut">
               <a:rPr lang="th-TH" smtClean="0"/>
-              <a:t>12/03/65</a:t>
+              <a:t>26/03/65</a:t>
             </a:fld>
             <a:endParaRPr lang="th-TH"/>
           </a:p>
@@ -2085,7 +2085,7 @@
           <a:p>
             <a:fld id="{4CA111CD-02F0-4221-AD8C-2FBDC4F2E84D}" type="datetimeFigureOut">
               <a:rPr lang="th-TH" smtClean="0"/>
-              <a:t>12/03/65</a:t>
+              <a:t>26/03/65</a:t>
             </a:fld>
             <a:endParaRPr lang="th-TH"/>
           </a:p>
@@ -2396,7 +2396,7 @@
           <a:p>
             <a:fld id="{4CA111CD-02F0-4221-AD8C-2FBDC4F2E84D}" type="datetimeFigureOut">
               <a:rPr lang="th-TH" smtClean="0"/>
-              <a:t>12/03/65</a:t>
+              <a:t>26/03/65</a:t>
             </a:fld>
             <a:endParaRPr lang="th-TH"/>
           </a:p>
@@ -2684,7 +2684,7 @@
           <a:p>
             <a:fld id="{4CA111CD-02F0-4221-AD8C-2FBDC4F2E84D}" type="datetimeFigureOut">
               <a:rPr lang="th-TH" smtClean="0"/>
-              <a:t>12/03/65</a:t>
+              <a:t>26/03/65</a:t>
             </a:fld>
             <a:endParaRPr lang="th-TH"/>
           </a:p>
@@ -2925,7 +2925,7 @@
           <a:p>
             <a:fld id="{4CA111CD-02F0-4221-AD8C-2FBDC4F2E84D}" type="datetimeFigureOut">
               <a:rPr lang="th-TH" smtClean="0"/>
-              <a:t>12/03/65</a:t>
+              <a:t>26/03/65</a:t>
             </a:fld>
             <a:endParaRPr lang="th-TH"/>
           </a:p>
@@ -8395,7 +8395,7 @@
         </p:nvSpPr>
         <p:spPr>
           <a:xfrm>
-            <a:off x="328176" y="2101362"/>
+            <a:off x="328176" y="2284242"/>
             <a:ext cx="9908930" cy="4401205"/>
           </a:xfrm>
           <a:prstGeom prst="rect">
@@ -8557,7 +8557,7 @@
         </p:nvSpPr>
         <p:spPr>
           <a:xfrm>
-            <a:off x="374072" y="625758"/>
+            <a:off x="473825" y="3934224"/>
             <a:ext cx="10989425" cy="2677656"/>
           </a:xfrm>
           <a:prstGeom prst="rect">
@@ -8636,6 +8636,138 @@
           </a:p>
           <a:p>
             <a:endParaRPr lang="en-US" sz="1200" dirty="0"/>
+          </a:p>
+        </p:txBody>
+      </p:sp>
+      <p:sp>
+        <p:nvSpPr>
+          <p:cNvPr id="4" name="TextBox 3">
+            <a:extLst>
+              <a:ext uri="{FF2B5EF4-FFF2-40B4-BE49-F238E27FC236}">
+                <a16:creationId xmlns:a16="http://schemas.microsoft.com/office/drawing/2014/main" id="{44E42017-2064-4CE5-851E-C8DA7B9281F2}"/>
+              </a:ext>
+            </a:extLst>
+          </p:cNvPr>
+          <p:cNvSpPr txBox="1"/>
+          <p:nvPr/>
+        </p:nvSpPr>
+        <p:spPr>
+          <a:xfrm>
+            <a:off x="920635" y="882078"/>
+            <a:ext cx="6097384" cy="954107"/>
+          </a:xfrm>
+          <a:prstGeom prst="rect">
+            <a:avLst/>
+          </a:prstGeom>
+          <a:noFill/>
+        </p:spPr>
+        <p:txBody>
+          <a:bodyPr wrap="square">
+            <a:spAutoFit/>
+          </a:bodyPr>
+          <a:lstStyle/>
+          <a:p>
+            <a:r>
+              <a:rPr lang="en-US" dirty="0">
+                <a:hlinkClick r:id="rId5"/>
+              </a:rPr>
+              <a:t>Alternative Wetting and Drying (Responses) - Google </a:t>
+            </a:r>
+            <a:r>
+              <a:rPr lang="th-TH" dirty="0">
+                <a:hlinkClick r:id="rId5"/>
+              </a:rPr>
+              <a:t>ชีต</a:t>
+            </a:r>
+            <a:endParaRPr lang="en-US" dirty="0"/>
+          </a:p>
+        </p:txBody>
+      </p:sp>
+      <p:sp>
+        <p:nvSpPr>
+          <p:cNvPr id="6" name="TextBox 5">
+            <a:extLst>
+              <a:ext uri="{FF2B5EF4-FFF2-40B4-BE49-F238E27FC236}">
+                <a16:creationId xmlns:a16="http://schemas.microsoft.com/office/drawing/2014/main" id="{BF8756D3-4624-4835-9EE2-8712B4F8891C}"/>
+              </a:ext>
+            </a:extLst>
+          </p:cNvPr>
+          <p:cNvSpPr txBox="1"/>
+          <p:nvPr/>
+        </p:nvSpPr>
+        <p:spPr>
+          <a:xfrm>
+            <a:off x="920635" y="1833881"/>
+            <a:ext cx="6097384" cy="954107"/>
+          </a:xfrm>
+          <a:prstGeom prst="rect">
+            <a:avLst/>
+          </a:prstGeom>
+          <a:noFill/>
+        </p:spPr>
+        <p:txBody>
+          <a:bodyPr wrap="square">
+            <a:spAutoFit/>
+          </a:bodyPr>
+          <a:lstStyle/>
+          <a:p>
+            <a:r>
+              <a:rPr lang="en-US" dirty="0">
+                <a:hlinkClick r:id="rId6"/>
+              </a:rPr>
+              <a:t>Saturated soil Irrigation (Responses) - Google </a:t>
+            </a:r>
+            <a:r>
+              <a:rPr lang="th-TH" dirty="0">
+                <a:hlinkClick r:id="rId6"/>
+              </a:rPr>
+              <a:t>ชีต</a:t>
+            </a:r>
+            <a:endParaRPr lang="en-US" dirty="0"/>
+          </a:p>
+        </p:txBody>
+      </p:sp>
+      <p:sp>
+        <p:nvSpPr>
+          <p:cNvPr id="8" name="TextBox 7">
+            <a:extLst>
+              <a:ext uri="{FF2B5EF4-FFF2-40B4-BE49-F238E27FC236}">
+                <a16:creationId xmlns:a16="http://schemas.microsoft.com/office/drawing/2014/main" id="{B451059D-40A5-424F-84C7-05C6FE0354DB}"/>
+              </a:ext>
+            </a:extLst>
+          </p:cNvPr>
+          <p:cNvSpPr txBox="1"/>
+          <p:nvPr/>
+        </p:nvSpPr>
+        <p:spPr>
+          <a:xfrm>
+            <a:off x="920635" y="2669314"/>
+            <a:ext cx="6097384" cy="954107"/>
+          </a:xfrm>
+          <a:prstGeom prst="rect">
+            <a:avLst/>
+          </a:prstGeom>
+          <a:noFill/>
+        </p:spPr>
+        <p:txBody>
+          <a:bodyPr wrap="square">
+            <a:spAutoFit/>
+          </a:bodyPr>
+          <a:lstStyle/>
+          <a:p>
+            <a:r>
+              <a:rPr lang="en-US" dirty="0">
+                <a:hlinkClick r:id="rId7"/>
+              </a:rPr>
+              <a:t>Continuous Flooding (Responses) - Google </a:t>
+            </a:r>
+            <a:r>
+              <a:rPr lang="th-TH" dirty="0">
+                <a:hlinkClick r:id="rId7"/>
+              </a:rPr>
+              <a:t>ชีต</a:t>
+            </a:r>
+            <a:endParaRPr lang="en-US" dirty="0"/>
           </a:p>
         </p:txBody>
       </p:sp>

</xml_diff>